<commit_message>
functions in sql server
</commit_message>
<xml_diff>
--- a/SQL_SERVER/INTRODUCTION_TO_SQL(4) (function).pptx
+++ b/SQL_SERVER/INTRODUCTION_TO_SQL(4) (function).pptx
@@ -4,6 +4,9 @@
   <p:sldMasterIdLst>
     <p:sldMasterId id="2147483878" r:id="rId1"/>
   </p:sldMasterIdLst>
+  <p:notesMasterIdLst>
+    <p:notesMasterId r:id="rId24"/>
+  </p:notesMasterIdLst>
   <p:sldIdLst>
     <p:sldId id="256" r:id="rId2"/>
     <p:sldId id="259" r:id="rId3"/>
@@ -20,6 +23,13 @@
     <p:sldId id="308" r:id="rId14"/>
     <p:sldId id="309" r:id="rId15"/>
     <p:sldId id="310" r:id="rId16"/>
+    <p:sldId id="311" r:id="rId17"/>
+    <p:sldId id="312" r:id="rId18"/>
+    <p:sldId id="313" r:id="rId19"/>
+    <p:sldId id="314" r:id="rId20"/>
+    <p:sldId id="315" r:id="rId21"/>
+    <p:sldId id="316" r:id="rId22"/>
+    <p:sldId id="317" r:id="rId23"/>
   </p:sldIdLst>
   <p:sldSz cx="12192000" cy="6858000"/>
   <p:notesSz cx="6858000" cy="9144000"/>
@@ -126,6 +136,523 @@
 </p:presentation>
 </file>
 
+<file path=ppt/notesMasters/notesMaster1.xml><?xml version="1.0" encoding="utf-8"?>
+<p:notesMaster xmlns:a="http://schemas.openxmlformats.org/drawingml/2006/main" xmlns:r="http://schemas.openxmlformats.org/officeDocument/2006/relationships" xmlns:p="http://schemas.openxmlformats.org/presentationml/2006/main">
+  <p:cSld>
+    <p:bg>
+      <p:bgRef idx="1001">
+        <a:schemeClr val="bg1"/>
+      </p:bgRef>
+    </p:bg>
+    <p:spTree>
+      <p:nvGrpSpPr>
+        <p:cNvPr id="1" name=""/>
+        <p:cNvGrpSpPr/>
+        <p:nvPr/>
+      </p:nvGrpSpPr>
+      <p:grpSpPr>
+        <a:xfrm>
+          <a:off x="0" y="0"/>
+          <a:ext cx="0" cy="0"/>
+          <a:chOff x="0" y="0"/>
+          <a:chExt cx="0" cy="0"/>
+        </a:xfrm>
+      </p:grpSpPr>
+      <p:sp>
+        <p:nvSpPr>
+          <p:cNvPr id="2" name="Header Placeholder 1"/>
+          <p:cNvSpPr>
+            <a:spLocks noGrp="1"/>
+          </p:cNvSpPr>
+          <p:nvPr>
+            <p:ph type="hdr" sz="quarter"/>
+          </p:nvPr>
+        </p:nvSpPr>
+        <p:spPr>
+          <a:xfrm>
+            <a:off x="0" y="0"/>
+            <a:ext cx="2971800" cy="458788"/>
+          </a:xfrm>
+          <a:prstGeom prst="rect">
+            <a:avLst/>
+          </a:prstGeom>
+        </p:spPr>
+        <p:txBody>
+          <a:bodyPr vert="horz" lIns="91440" tIns="45720" rIns="91440" bIns="45720" rtlCol="0"/>
+          <a:lstStyle>
+            <a:lvl1pPr algn="l">
+              <a:defRPr sz="1200"/>
+            </a:lvl1pPr>
+          </a:lstStyle>
+          <a:p>
+            <a:endParaRPr lang="en-US"/>
+          </a:p>
+        </p:txBody>
+      </p:sp>
+      <p:sp>
+        <p:nvSpPr>
+          <p:cNvPr id="3" name="Date Placeholder 2"/>
+          <p:cNvSpPr>
+            <a:spLocks noGrp="1"/>
+          </p:cNvSpPr>
+          <p:nvPr>
+            <p:ph type="dt" idx="1"/>
+          </p:nvPr>
+        </p:nvSpPr>
+        <p:spPr>
+          <a:xfrm>
+            <a:off x="3884613" y="0"/>
+            <a:ext cx="2971800" cy="458788"/>
+          </a:xfrm>
+          <a:prstGeom prst="rect">
+            <a:avLst/>
+          </a:prstGeom>
+        </p:spPr>
+        <p:txBody>
+          <a:bodyPr vert="horz" lIns="91440" tIns="45720" rIns="91440" bIns="45720" rtlCol="0"/>
+          <a:lstStyle>
+            <a:lvl1pPr algn="r">
+              <a:defRPr sz="1200"/>
+            </a:lvl1pPr>
+          </a:lstStyle>
+          <a:p>
+            <a:fld id="{3A238AB8-A959-4BA8-A1EE-E4C53C860245}" type="datetimeFigureOut">
+              <a:rPr lang="en-US" smtClean="0"/>
+              <a:t>7/9/2024</a:t>
+            </a:fld>
+            <a:endParaRPr lang="en-US"/>
+          </a:p>
+        </p:txBody>
+      </p:sp>
+      <p:sp>
+        <p:nvSpPr>
+          <p:cNvPr id="4" name="Slide Image Placeholder 3"/>
+          <p:cNvSpPr>
+            <a:spLocks noGrp="1" noRot="1" noChangeAspect="1"/>
+          </p:cNvSpPr>
+          <p:nvPr>
+            <p:ph type="sldImg" idx="2"/>
+          </p:nvPr>
+        </p:nvSpPr>
+        <p:spPr>
+          <a:xfrm>
+            <a:off x="685800" y="1143000"/>
+            <a:ext cx="5486400" cy="3086100"/>
+          </a:xfrm>
+          <a:prstGeom prst="rect">
+            <a:avLst/>
+          </a:prstGeom>
+          <a:noFill/>
+          <a:ln w="12700">
+            <a:solidFill>
+              <a:prstClr val="black"/>
+            </a:solidFill>
+          </a:ln>
+        </p:spPr>
+        <p:txBody>
+          <a:bodyPr vert="horz" lIns="91440" tIns="45720" rIns="91440" bIns="45720" rtlCol="0" anchor="ctr"/>
+          <a:lstStyle/>
+          <a:p>
+            <a:endParaRPr lang="en-US"/>
+          </a:p>
+        </p:txBody>
+      </p:sp>
+      <p:sp>
+        <p:nvSpPr>
+          <p:cNvPr id="5" name="Notes Placeholder 4"/>
+          <p:cNvSpPr>
+            <a:spLocks noGrp="1"/>
+          </p:cNvSpPr>
+          <p:nvPr>
+            <p:ph type="body" sz="quarter" idx="3"/>
+          </p:nvPr>
+        </p:nvSpPr>
+        <p:spPr>
+          <a:xfrm>
+            <a:off x="685800" y="4400550"/>
+            <a:ext cx="5486400" cy="3600450"/>
+          </a:xfrm>
+          <a:prstGeom prst="rect">
+            <a:avLst/>
+          </a:prstGeom>
+        </p:spPr>
+        <p:txBody>
+          <a:bodyPr vert="horz" lIns="91440" tIns="45720" rIns="91440" bIns="45720" rtlCol="0"/>
+          <a:lstStyle/>
+          <a:p>
+            <a:pPr lvl="0"/>
+            <a:r>
+              <a:rPr lang="en-US"/>
+              <a:t>Click to edit Master text styles</a:t>
+            </a:r>
+          </a:p>
+          <a:p>
+            <a:pPr lvl="1"/>
+            <a:r>
+              <a:rPr lang="en-US"/>
+              <a:t>Second level</a:t>
+            </a:r>
+          </a:p>
+          <a:p>
+            <a:pPr lvl="2"/>
+            <a:r>
+              <a:rPr lang="en-US"/>
+              <a:t>Third level</a:t>
+            </a:r>
+          </a:p>
+          <a:p>
+            <a:pPr lvl="3"/>
+            <a:r>
+              <a:rPr lang="en-US"/>
+              <a:t>Fourth level</a:t>
+            </a:r>
+          </a:p>
+          <a:p>
+            <a:pPr lvl="4"/>
+            <a:r>
+              <a:rPr lang="en-US"/>
+              <a:t>Fifth level</a:t>
+            </a:r>
+          </a:p>
+        </p:txBody>
+      </p:sp>
+      <p:sp>
+        <p:nvSpPr>
+          <p:cNvPr id="6" name="Footer Placeholder 5"/>
+          <p:cNvSpPr>
+            <a:spLocks noGrp="1"/>
+          </p:cNvSpPr>
+          <p:nvPr>
+            <p:ph type="ftr" sz="quarter" idx="4"/>
+          </p:nvPr>
+        </p:nvSpPr>
+        <p:spPr>
+          <a:xfrm>
+            <a:off x="0" y="8685213"/>
+            <a:ext cx="2971800" cy="458787"/>
+          </a:xfrm>
+          <a:prstGeom prst="rect">
+            <a:avLst/>
+          </a:prstGeom>
+        </p:spPr>
+        <p:txBody>
+          <a:bodyPr vert="horz" lIns="91440" tIns="45720" rIns="91440" bIns="45720" rtlCol="0" anchor="b"/>
+          <a:lstStyle>
+            <a:lvl1pPr algn="l">
+              <a:defRPr sz="1200"/>
+            </a:lvl1pPr>
+          </a:lstStyle>
+          <a:p>
+            <a:endParaRPr lang="en-US"/>
+          </a:p>
+        </p:txBody>
+      </p:sp>
+      <p:sp>
+        <p:nvSpPr>
+          <p:cNvPr id="7" name="Slide Number Placeholder 6"/>
+          <p:cNvSpPr>
+            <a:spLocks noGrp="1"/>
+          </p:cNvSpPr>
+          <p:nvPr>
+            <p:ph type="sldNum" sz="quarter" idx="5"/>
+          </p:nvPr>
+        </p:nvSpPr>
+        <p:spPr>
+          <a:xfrm>
+            <a:off x="3884613" y="8685213"/>
+            <a:ext cx="2971800" cy="458787"/>
+          </a:xfrm>
+          <a:prstGeom prst="rect">
+            <a:avLst/>
+          </a:prstGeom>
+        </p:spPr>
+        <p:txBody>
+          <a:bodyPr vert="horz" lIns="91440" tIns="45720" rIns="91440" bIns="45720" rtlCol="0" anchor="b"/>
+          <a:lstStyle>
+            <a:lvl1pPr algn="r">
+              <a:defRPr sz="1200"/>
+            </a:lvl1pPr>
+          </a:lstStyle>
+          <a:p>
+            <a:fld id="{CEF2BC59-7490-4817-8F62-DD4EFB08573F}" type="slidenum">
+              <a:rPr lang="en-US" smtClean="0"/>
+              <a:t>‹#›</a:t>
+            </a:fld>
+            <a:endParaRPr lang="en-US"/>
+          </a:p>
+        </p:txBody>
+      </p:sp>
+    </p:spTree>
+    <p:extLst>
+      <p:ext uri="{BB962C8B-B14F-4D97-AF65-F5344CB8AC3E}">
+        <p14:creationId xmlns:p14="http://schemas.microsoft.com/office/powerpoint/2010/main" val="2282325698"/>
+      </p:ext>
+    </p:extLst>
+  </p:cSld>
+  <p:clrMap bg1="lt1" tx1="dk1" bg2="lt2" tx2="dk2" accent1="accent1" accent2="accent2" accent3="accent3" accent4="accent4" accent5="accent5" accent6="accent6" hlink="hlink" folHlink="folHlink"/>
+  <p:notesStyle>
+    <a:lvl1pPr marL="0" algn="l" defTabSz="914400" rtl="0" eaLnBrk="1" latinLnBrk="0" hangingPunct="1">
+      <a:defRPr sz="1200" kern="1200">
+        <a:solidFill>
+          <a:schemeClr val="tx1"/>
+        </a:solidFill>
+        <a:latin typeface="+mn-lt"/>
+        <a:ea typeface="+mn-ea"/>
+        <a:cs typeface="+mn-cs"/>
+      </a:defRPr>
+    </a:lvl1pPr>
+    <a:lvl2pPr marL="457200" algn="l" defTabSz="914400" rtl="0" eaLnBrk="1" latinLnBrk="0" hangingPunct="1">
+      <a:defRPr sz="1200" kern="1200">
+        <a:solidFill>
+          <a:schemeClr val="tx1"/>
+        </a:solidFill>
+        <a:latin typeface="+mn-lt"/>
+        <a:ea typeface="+mn-ea"/>
+        <a:cs typeface="+mn-cs"/>
+      </a:defRPr>
+    </a:lvl2pPr>
+    <a:lvl3pPr marL="914400" algn="l" defTabSz="914400" rtl="0" eaLnBrk="1" latinLnBrk="0" hangingPunct="1">
+      <a:defRPr sz="1200" kern="1200">
+        <a:solidFill>
+          <a:schemeClr val="tx1"/>
+        </a:solidFill>
+        <a:latin typeface="+mn-lt"/>
+        <a:ea typeface="+mn-ea"/>
+        <a:cs typeface="+mn-cs"/>
+      </a:defRPr>
+    </a:lvl3pPr>
+    <a:lvl4pPr marL="1371600" algn="l" defTabSz="914400" rtl="0" eaLnBrk="1" latinLnBrk="0" hangingPunct="1">
+      <a:defRPr sz="1200" kern="1200">
+        <a:solidFill>
+          <a:schemeClr val="tx1"/>
+        </a:solidFill>
+        <a:latin typeface="+mn-lt"/>
+        <a:ea typeface="+mn-ea"/>
+        <a:cs typeface="+mn-cs"/>
+      </a:defRPr>
+    </a:lvl4pPr>
+    <a:lvl5pPr marL="1828800" algn="l" defTabSz="914400" rtl="0" eaLnBrk="1" latinLnBrk="0" hangingPunct="1">
+      <a:defRPr sz="1200" kern="1200">
+        <a:solidFill>
+          <a:schemeClr val="tx1"/>
+        </a:solidFill>
+        <a:latin typeface="+mn-lt"/>
+        <a:ea typeface="+mn-ea"/>
+        <a:cs typeface="+mn-cs"/>
+      </a:defRPr>
+    </a:lvl5pPr>
+    <a:lvl6pPr marL="2286000" algn="l" defTabSz="914400" rtl="0" eaLnBrk="1" latinLnBrk="0" hangingPunct="1">
+      <a:defRPr sz="1200" kern="1200">
+        <a:solidFill>
+          <a:schemeClr val="tx1"/>
+        </a:solidFill>
+        <a:latin typeface="+mn-lt"/>
+        <a:ea typeface="+mn-ea"/>
+        <a:cs typeface="+mn-cs"/>
+      </a:defRPr>
+    </a:lvl6pPr>
+    <a:lvl7pPr marL="2743200" algn="l" defTabSz="914400" rtl="0" eaLnBrk="1" latinLnBrk="0" hangingPunct="1">
+      <a:defRPr sz="1200" kern="1200">
+        <a:solidFill>
+          <a:schemeClr val="tx1"/>
+        </a:solidFill>
+        <a:latin typeface="+mn-lt"/>
+        <a:ea typeface="+mn-ea"/>
+        <a:cs typeface="+mn-cs"/>
+      </a:defRPr>
+    </a:lvl7pPr>
+    <a:lvl8pPr marL="3200400" algn="l" defTabSz="914400" rtl="0" eaLnBrk="1" latinLnBrk="0" hangingPunct="1">
+      <a:defRPr sz="1200" kern="1200">
+        <a:solidFill>
+          <a:schemeClr val="tx1"/>
+        </a:solidFill>
+        <a:latin typeface="+mn-lt"/>
+        <a:ea typeface="+mn-ea"/>
+        <a:cs typeface="+mn-cs"/>
+      </a:defRPr>
+    </a:lvl8pPr>
+    <a:lvl9pPr marL="3657600" algn="l" defTabSz="914400" rtl="0" eaLnBrk="1" latinLnBrk="0" hangingPunct="1">
+      <a:defRPr sz="1200" kern="1200">
+        <a:solidFill>
+          <a:schemeClr val="tx1"/>
+        </a:solidFill>
+        <a:latin typeface="+mn-lt"/>
+        <a:ea typeface="+mn-ea"/>
+        <a:cs typeface="+mn-cs"/>
+      </a:defRPr>
+    </a:lvl9pPr>
+  </p:notesStyle>
+</p:notesMaster>
+</file>
+
+<file path=ppt/notesSlides/notesSlide1.xml><?xml version="1.0" encoding="utf-8"?>
+<p:notes xmlns:a="http://schemas.openxmlformats.org/drawingml/2006/main" xmlns:r="http://schemas.openxmlformats.org/officeDocument/2006/relationships" xmlns:p="http://schemas.openxmlformats.org/presentationml/2006/main">
+  <p:cSld>
+    <p:spTree>
+      <p:nvGrpSpPr>
+        <p:cNvPr id="1" name=""/>
+        <p:cNvGrpSpPr/>
+        <p:nvPr/>
+      </p:nvGrpSpPr>
+      <p:grpSpPr>
+        <a:xfrm>
+          <a:off x="0" y="0"/>
+          <a:ext cx="0" cy="0"/>
+          <a:chOff x="0" y="0"/>
+          <a:chExt cx="0" cy="0"/>
+        </a:xfrm>
+      </p:grpSpPr>
+      <p:sp>
+        <p:nvSpPr>
+          <p:cNvPr id="2" name="Slide Image Placeholder 1"/>
+          <p:cNvSpPr>
+            <a:spLocks noGrp="1" noRot="1" noChangeAspect="1"/>
+          </p:cNvSpPr>
+          <p:nvPr>
+            <p:ph type="sldImg"/>
+          </p:nvPr>
+        </p:nvSpPr>
+        <p:spPr/>
+      </p:sp>
+      <p:sp>
+        <p:nvSpPr>
+          <p:cNvPr id="3" name="Notes Placeholder 2"/>
+          <p:cNvSpPr>
+            <a:spLocks noGrp="1"/>
+          </p:cNvSpPr>
+          <p:nvPr>
+            <p:ph type="body" idx="1"/>
+          </p:nvPr>
+        </p:nvSpPr>
+        <p:spPr/>
+        <p:txBody>
+          <a:bodyPr/>
+          <a:lstStyle/>
+          <a:p>
+            <a:endParaRPr lang="en-US" dirty="0"/>
+          </a:p>
+        </p:txBody>
+      </p:sp>
+      <p:sp>
+        <p:nvSpPr>
+          <p:cNvPr id="4" name="Slide Number Placeholder 3"/>
+          <p:cNvSpPr>
+            <a:spLocks noGrp="1"/>
+          </p:cNvSpPr>
+          <p:nvPr>
+            <p:ph type="sldNum" sz="quarter" idx="5"/>
+          </p:nvPr>
+        </p:nvSpPr>
+        <p:spPr/>
+        <p:txBody>
+          <a:bodyPr/>
+          <a:lstStyle/>
+          <a:p>
+            <a:fld id="{CEF2BC59-7490-4817-8F62-DD4EFB08573F}" type="slidenum">
+              <a:rPr lang="en-US" smtClean="0"/>
+              <a:t>21</a:t>
+            </a:fld>
+            <a:endParaRPr lang="en-US"/>
+          </a:p>
+        </p:txBody>
+      </p:sp>
+    </p:spTree>
+    <p:extLst>
+      <p:ext uri="{BB962C8B-B14F-4D97-AF65-F5344CB8AC3E}">
+        <p14:creationId xmlns:p14="http://schemas.microsoft.com/office/powerpoint/2010/main" val="2098262242"/>
+      </p:ext>
+    </p:extLst>
+  </p:cSld>
+  <p:clrMapOvr>
+    <a:masterClrMapping/>
+  </p:clrMapOvr>
+</p:notes>
+</file>
+
+<file path=ppt/notesSlides/notesSlide2.xml><?xml version="1.0" encoding="utf-8"?>
+<p:notes xmlns:a="http://schemas.openxmlformats.org/drawingml/2006/main" xmlns:r="http://schemas.openxmlformats.org/officeDocument/2006/relationships" xmlns:p="http://schemas.openxmlformats.org/presentationml/2006/main">
+  <p:cSld>
+    <p:spTree>
+      <p:nvGrpSpPr>
+        <p:cNvPr id="1" name=""/>
+        <p:cNvGrpSpPr/>
+        <p:nvPr/>
+      </p:nvGrpSpPr>
+      <p:grpSpPr>
+        <a:xfrm>
+          <a:off x="0" y="0"/>
+          <a:ext cx="0" cy="0"/>
+          <a:chOff x="0" y="0"/>
+          <a:chExt cx="0" cy="0"/>
+        </a:xfrm>
+      </p:grpSpPr>
+      <p:sp>
+        <p:nvSpPr>
+          <p:cNvPr id="2" name="Slide Image Placeholder 1"/>
+          <p:cNvSpPr>
+            <a:spLocks noGrp="1" noRot="1" noChangeAspect="1"/>
+          </p:cNvSpPr>
+          <p:nvPr>
+            <p:ph type="sldImg"/>
+          </p:nvPr>
+        </p:nvSpPr>
+        <p:spPr/>
+      </p:sp>
+      <p:sp>
+        <p:nvSpPr>
+          <p:cNvPr id="3" name="Notes Placeholder 2"/>
+          <p:cNvSpPr>
+            <a:spLocks noGrp="1"/>
+          </p:cNvSpPr>
+          <p:nvPr>
+            <p:ph type="body" idx="1"/>
+          </p:nvPr>
+        </p:nvSpPr>
+        <p:spPr/>
+        <p:txBody>
+          <a:bodyPr/>
+          <a:lstStyle/>
+          <a:p>
+            <a:endParaRPr lang="en-US" dirty="0"/>
+          </a:p>
+        </p:txBody>
+      </p:sp>
+      <p:sp>
+        <p:nvSpPr>
+          <p:cNvPr id="4" name="Slide Number Placeholder 3"/>
+          <p:cNvSpPr>
+            <a:spLocks noGrp="1"/>
+          </p:cNvSpPr>
+          <p:nvPr>
+            <p:ph type="sldNum" sz="quarter" idx="5"/>
+          </p:nvPr>
+        </p:nvSpPr>
+        <p:spPr/>
+        <p:txBody>
+          <a:bodyPr/>
+          <a:lstStyle/>
+          <a:p>
+            <a:fld id="{CEF2BC59-7490-4817-8F62-DD4EFB08573F}" type="slidenum">
+              <a:rPr lang="en-US" smtClean="0"/>
+              <a:t>22</a:t>
+            </a:fld>
+            <a:endParaRPr lang="en-US"/>
+          </a:p>
+        </p:txBody>
+      </p:sp>
+    </p:spTree>
+    <p:extLst>
+      <p:ext uri="{BB962C8B-B14F-4D97-AF65-F5344CB8AC3E}">
+        <p14:creationId xmlns:p14="http://schemas.microsoft.com/office/powerpoint/2010/main" val="2174018818"/>
+      </p:ext>
+    </p:extLst>
+  </p:cSld>
+  <p:clrMapOvr>
+    <a:masterClrMapping/>
+  </p:clrMapOvr>
+</p:notes>
+</file>
+
 <file path=ppt/slideLayouts/slideLayout1.xml><?xml version="1.0" encoding="utf-8"?>
 <p:sldLayout xmlns:a="http://schemas.openxmlformats.org/drawingml/2006/main" xmlns:r="http://schemas.openxmlformats.org/officeDocument/2006/relationships" xmlns:p="http://schemas.openxmlformats.org/presentationml/2006/main" type="title" preserve="1">
   <p:cSld name="Title Slide">
@@ -320,7 +847,7 @@
           <a:p>
             <a:fld id="{F0D60A6E-7201-4A4D-A930-2F88FE528610}" type="datetimeFigureOut">
               <a:rPr lang="en-US" smtClean="0"/>
-              <a:t>7/8/2024</a:t>
+              <a:t>7/9/2024</a:t>
             </a:fld>
             <a:endParaRPr lang="en-US"/>
           </a:p>
@@ -490,7 +1017,7 @@
           <a:p>
             <a:fld id="{F0D60A6E-7201-4A4D-A930-2F88FE528610}" type="datetimeFigureOut">
               <a:rPr lang="en-US" smtClean="0"/>
-              <a:t>7/8/2024</a:t>
+              <a:t>7/9/2024</a:t>
             </a:fld>
             <a:endParaRPr lang="en-US"/>
           </a:p>
@@ -711,7 +1238,7 @@
           <a:p>
             <a:fld id="{F0D60A6E-7201-4A4D-A930-2F88FE528610}" type="datetimeFigureOut">
               <a:rPr lang="en-US" smtClean="0"/>
-              <a:t>7/8/2024</a:t>
+              <a:t>7/9/2024</a:t>
             </a:fld>
             <a:endParaRPr lang="en-US"/>
           </a:p>
@@ -922,7 +1449,7 @@
           <a:p>
             <a:fld id="{F0D60A6E-7201-4A4D-A930-2F88FE528610}" type="datetimeFigureOut">
               <a:rPr lang="en-US" smtClean="0"/>
-              <a:t>7/8/2024</a:t>
+              <a:t>7/9/2024</a:t>
             </a:fld>
             <a:endParaRPr lang="en-US"/>
           </a:p>
@@ -1217,7 +1744,7 @@
           <a:p>
             <a:fld id="{F0D60A6E-7201-4A4D-A930-2F88FE528610}" type="datetimeFigureOut">
               <a:rPr lang="en-US" smtClean="0"/>
-              <a:t>7/8/2024</a:t>
+              <a:t>7/9/2024</a:t>
             </a:fld>
             <a:endParaRPr lang="en-US"/>
           </a:p>
@@ -1546,7 +2073,7 @@
           <a:p>
             <a:fld id="{F0D60A6E-7201-4A4D-A930-2F88FE528610}" type="datetimeFigureOut">
               <a:rPr lang="en-US" smtClean="0"/>
-              <a:t>7/8/2024</a:t>
+              <a:t>7/9/2024</a:t>
             </a:fld>
             <a:endParaRPr lang="en-US"/>
           </a:p>
@@ -2038,7 +2565,7 @@
           <a:p>
             <a:fld id="{F0D60A6E-7201-4A4D-A930-2F88FE528610}" type="datetimeFigureOut">
               <a:rPr lang="en-US" smtClean="0"/>
-              <a:t>7/8/2024</a:t>
+              <a:t>7/9/2024</a:t>
             </a:fld>
             <a:endParaRPr lang="en-US"/>
           </a:p>
@@ -2197,7 +2724,7 @@
           <a:p>
             <a:fld id="{F0D60A6E-7201-4A4D-A930-2F88FE528610}" type="datetimeFigureOut">
               <a:rPr lang="en-US" smtClean="0"/>
-              <a:t>7/8/2024</a:t>
+              <a:t>7/9/2024</a:t>
             </a:fld>
             <a:endParaRPr lang="en-US"/>
           </a:p>
@@ -2333,7 +2860,7 @@
           <a:p>
             <a:fld id="{F0D60A6E-7201-4A4D-A930-2F88FE528610}" type="datetimeFigureOut">
               <a:rPr lang="en-US" smtClean="0"/>
-              <a:t>7/8/2024</a:t>
+              <a:t>7/9/2024</a:t>
             </a:fld>
             <a:endParaRPr lang="en-US"/>
           </a:p>
@@ -2661,7 +3188,7 @@
           <a:p>
             <a:fld id="{F0D60A6E-7201-4A4D-A930-2F88FE528610}" type="datetimeFigureOut">
               <a:rPr lang="en-US" smtClean="0"/>
-              <a:t>7/8/2024</a:t>
+              <a:t>7/9/2024</a:t>
             </a:fld>
             <a:endParaRPr lang="en-US"/>
           </a:p>
@@ -2976,7 +3503,7 @@
           <a:p>
             <a:fld id="{F0D60A6E-7201-4A4D-A930-2F88FE528610}" type="datetimeFigureOut">
               <a:rPr lang="en-US" smtClean="0"/>
-              <a:t>7/8/2024</a:t>
+              <a:t>7/9/2024</a:t>
             </a:fld>
             <a:endParaRPr lang="en-US"/>
           </a:p>
@@ -3228,7 +3755,7 @@
           <a:p>
             <a:fld id="{F0D60A6E-7201-4A4D-A930-2F88FE528610}" type="datetimeFigureOut">
               <a:rPr lang="en-US" smtClean="0"/>
-              <a:t>7/8/2024</a:t>
+              <a:t>7/9/2024</a:t>
             </a:fld>
             <a:endParaRPr lang="en-US"/>
           </a:p>
@@ -4789,6 +5316,638 @@
 </p:sld>
 </file>
 
+<file path=ppt/slides/slide16.xml><?xml version="1.0" encoding="utf-8"?>
+<p:sld xmlns:a="http://schemas.openxmlformats.org/drawingml/2006/main" xmlns:r="http://schemas.openxmlformats.org/officeDocument/2006/relationships" xmlns:p="http://schemas.openxmlformats.org/presentationml/2006/main">
+  <p:cSld>
+    <p:spTree>
+      <p:nvGrpSpPr>
+        <p:cNvPr id="1" name=""/>
+        <p:cNvGrpSpPr/>
+        <p:nvPr/>
+      </p:nvGrpSpPr>
+      <p:grpSpPr>
+        <a:xfrm>
+          <a:off x="0" y="0"/>
+          <a:ext cx="0" cy="0"/>
+          <a:chOff x="0" y="0"/>
+          <a:chExt cx="0" cy="0"/>
+        </a:xfrm>
+      </p:grpSpPr>
+      <p:sp>
+        <p:nvSpPr>
+          <p:cNvPr id="5" name="TextBox 4">
+            <a:extLst>
+              <a:ext uri="{FF2B5EF4-FFF2-40B4-BE49-F238E27FC236}">
+                <a16:creationId xmlns:a16="http://schemas.microsoft.com/office/drawing/2014/main" id="{44085D18-8669-A35D-D918-DDFE81A3579D}"/>
+              </a:ext>
+            </a:extLst>
+          </p:cNvPr>
+          <p:cNvSpPr txBox="1"/>
+          <p:nvPr/>
+        </p:nvSpPr>
+        <p:spPr>
+          <a:xfrm>
+            <a:off x="3044824" y="0"/>
+            <a:ext cx="6810375" cy="830997"/>
+          </a:xfrm>
+          <a:prstGeom prst="rect">
+            <a:avLst/>
+          </a:prstGeom>
+          <a:noFill/>
+        </p:spPr>
+        <p:txBody>
+          <a:bodyPr wrap="square">
+            <a:spAutoFit/>
+          </a:bodyPr>
+          <a:lstStyle/>
+          <a:p>
+            <a:pPr algn="ctr"/>
+            <a:r>
+              <a:rPr lang="en-US" sz="4800" b="1" i="0" dirty="0">
+                <a:ln w="22225">
+                  <a:solidFill>
+                    <a:schemeClr val="accent2"/>
+                  </a:solidFill>
+                  <a:prstDash val="solid"/>
+                </a:ln>
+                <a:solidFill>
+                  <a:schemeClr val="accent2">
+                    <a:lumMod val="40000"/>
+                    <a:lumOff val="60000"/>
+                  </a:schemeClr>
+                </a:solidFill>
+                <a:highlight>
+                  <a:srgbClr val="FFFFFF"/>
+                </a:highlight>
+                <a:latin typeface="Wotfard"/>
+              </a:rPr>
+              <a:t>Functions In SQL Server</a:t>
+            </a:r>
+          </a:p>
+        </p:txBody>
+      </p:sp>
+      <p:sp>
+        <p:nvSpPr>
+          <p:cNvPr id="9" name="AutoShape 2" descr="sqlserver-page">
+            <a:extLst>
+              <a:ext uri="{FF2B5EF4-FFF2-40B4-BE49-F238E27FC236}">
+                <a16:creationId xmlns:a16="http://schemas.microsoft.com/office/drawing/2014/main" id="{391C2F74-10A7-C19E-24EE-7E95D18FFE1C}"/>
+              </a:ext>
+            </a:extLst>
+          </p:cNvPr>
+          <p:cNvSpPr>
+            <a:spLocks noChangeAspect="1" noChangeArrowheads="1"/>
+          </p:cNvSpPr>
+          <p:nvPr/>
+        </p:nvSpPr>
+        <p:spPr bwMode="auto">
+          <a:xfrm>
+            <a:off x="5943600" y="3276600"/>
+            <a:ext cx="304800" cy="304800"/>
+          </a:xfrm>
+          <a:prstGeom prst="rect">
+            <a:avLst/>
+          </a:prstGeom>
+          <a:noFill/>
+          <a:extLst>
+            <a:ext uri="{909E8E84-426E-40DD-AFC4-6F175D3DCCD1}">
+              <a14:hiddenFill xmlns:a14="http://schemas.microsoft.com/office/drawing/2010/main">
+                <a:solidFill>
+                  <a:srgbClr val="FFFFFF"/>
+                </a:solidFill>
+              </a14:hiddenFill>
+            </a:ext>
+          </a:extLst>
+        </p:spPr>
+        <p:txBody>
+          <a:bodyPr vert="horz" wrap="square" lIns="91440" tIns="45720" rIns="91440" bIns="45720" numCol="1" anchor="t" anchorCtr="0" compatLnSpc="1">
+            <a:prstTxWarp prst="textNoShape">
+              <a:avLst/>
+            </a:prstTxWarp>
+          </a:bodyPr>
+          <a:lstStyle/>
+          <a:p>
+            <a:endParaRPr lang="en-US"/>
+          </a:p>
+        </p:txBody>
+      </p:sp>
+      <p:pic>
+        <p:nvPicPr>
+          <p:cNvPr id="3" name="Picture 2">
+            <a:extLst>
+              <a:ext uri="{FF2B5EF4-FFF2-40B4-BE49-F238E27FC236}">
+                <a16:creationId xmlns:a16="http://schemas.microsoft.com/office/drawing/2014/main" id="{6B4F3FE0-117E-2A8F-2BE0-CD4ED78DB462}"/>
+              </a:ext>
+            </a:extLst>
+          </p:cNvPr>
+          <p:cNvPicPr>
+            <a:picLocks noChangeAspect="1"/>
+          </p:cNvPicPr>
+          <p:nvPr/>
+        </p:nvPicPr>
+        <p:blipFill>
+          <a:blip r:embed="rId2"/>
+          <a:stretch>
+            <a:fillRect/>
+          </a:stretch>
+        </p:blipFill>
+        <p:spPr>
+          <a:xfrm>
+            <a:off x="2899916" y="1933366"/>
+            <a:ext cx="6392167" cy="2991267"/>
+          </a:xfrm>
+          <a:prstGeom prst="rect">
+            <a:avLst/>
+          </a:prstGeom>
+        </p:spPr>
+      </p:pic>
+    </p:spTree>
+    <p:extLst>
+      <p:ext uri="{BB962C8B-B14F-4D97-AF65-F5344CB8AC3E}">
+        <p14:creationId xmlns:p14="http://schemas.microsoft.com/office/powerpoint/2010/main" val="3525869780"/>
+      </p:ext>
+    </p:extLst>
+  </p:cSld>
+  <p:clrMapOvr>
+    <a:masterClrMapping/>
+  </p:clrMapOvr>
+</p:sld>
+</file>
+
+<file path=ppt/slides/slide17.xml><?xml version="1.0" encoding="utf-8"?>
+<p:sld xmlns:a="http://schemas.openxmlformats.org/drawingml/2006/main" xmlns:r="http://schemas.openxmlformats.org/officeDocument/2006/relationships" xmlns:p="http://schemas.openxmlformats.org/presentationml/2006/main">
+  <p:cSld>
+    <p:spTree>
+      <p:nvGrpSpPr>
+        <p:cNvPr id="1" name=""/>
+        <p:cNvGrpSpPr/>
+        <p:nvPr/>
+      </p:nvGrpSpPr>
+      <p:grpSpPr>
+        <a:xfrm>
+          <a:off x="0" y="0"/>
+          <a:ext cx="0" cy="0"/>
+          <a:chOff x="0" y="0"/>
+          <a:chExt cx="0" cy="0"/>
+        </a:xfrm>
+      </p:grpSpPr>
+      <p:sp>
+        <p:nvSpPr>
+          <p:cNvPr id="5" name="TextBox 4">
+            <a:extLst>
+              <a:ext uri="{FF2B5EF4-FFF2-40B4-BE49-F238E27FC236}">
+                <a16:creationId xmlns:a16="http://schemas.microsoft.com/office/drawing/2014/main" id="{44085D18-8669-A35D-D918-DDFE81A3579D}"/>
+              </a:ext>
+            </a:extLst>
+          </p:cNvPr>
+          <p:cNvSpPr txBox="1"/>
+          <p:nvPr/>
+        </p:nvSpPr>
+        <p:spPr>
+          <a:xfrm>
+            <a:off x="3044824" y="0"/>
+            <a:ext cx="6810375" cy="830997"/>
+          </a:xfrm>
+          <a:prstGeom prst="rect">
+            <a:avLst/>
+          </a:prstGeom>
+          <a:noFill/>
+        </p:spPr>
+        <p:txBody>
+          <a:bodyPr wrap="square">
+            <a:spAutoFit/>
+          </a:bodyPr>
+          <a:lstStyle/>
+          <a:p>
+            <a:pPr algn="ctr"/>
+            <a:r>
+              <a:rPr lang="en-US" sz="4800" b="1" i="0" dirty="0">
+                <a:ln w="22225">
+                  <a:solidFill>
+                    <a:schemeClr val="accent2"/>
+                  </a:solidFill>
+                  <a:prstDash val="solid"/>
+                </a:ln>
+                <a:solidFill>
+                  <a:schemeClr val="accent2">
+                    <a:lumMod val="40000"/>
+                    <a:lumOff val="60000"/>
+                  </a:schemeClr>
+                </a:solidFill>
+                <a:highlight>
+                  <a:srgbClr val="FFFFFF"/>
+                </a:highlight>
+                <a:latin typeface="Wotfard"/>
+              </a:rPr>
+              <a:t>Functions In SQL Server</a:t>
+            </a:r>
+          </a:p>
+        </p:txBody>
+      </p:sp>
+      <p:sp>
+        <p:nvSpPr>
+          <p:cNvPr id="9" name="AutoShape 2" descr="sqlserver-page">
+            <a:extLst>
+              <a:ext uri="{FF2B5EF4-FFF2-40B4-BE49-F238E27FC236}">
+                <a16:creationId xmlns:a16="http://schemas.microsoft.com/office/drawing/2014/main" id="{391C2F74-10A7-C19E-24EE-7E95D18FFE1C}"/>
+              </a:ext>
+            </a:extLst>
+          </p:cNvPr>
+          <p:cNvSpPr>
+            <a:spLocks noChangeAspect="1" noChangeArrowheads="1"/>
+          </p:cNvSpPr>
+          <p:nvPr/>
+        </p:nvSpPr>
+        <p:spPr bwMode="auto">
+          <a:xfrm>
+            <a:off x="5943600" y="3276600"/>
+            <a:ext cx="304800" cy="304800"/>
+          </a:xfrm>
+          <a:prstGeom prst="rect">
+            <a:avLst/>
+          </a:prstGeom>
+          <a:noFill/>
+          <a:extLst>
+            <a:ext uri="{909E8E84-426E-40DD-AFC4-6F175D3DCCD1}">
+              <a14:hiddenFill xmlns:a14="http://schemas.microsoft.com/office/drawing/2010/main">
+                <a:solidFill>
+                  <a:srgbClr val="FFFFFF"/>
+                </a:solidFill>
+              </a14:hiddenFill>
+            </a:ext>
+          </a:extLst>
+        </p:spPr>
+        <p:txBody>
+          <a:bodyPr vert="horz" wrap="square" lIns="91440" tIns="45720" rIns="91440" bIns="45720" numCol="1" anchor="t" anchorCtr="0" compatLnSpc="1">
+            <a:prstTxWarp prst="textNoShape">
+              <a:avLst/>
+            </a:prstTxWarp>
+          </a:bodyPr>
+          <a:lstStyle/>
+          <a:p>
+            <a:endParaRPr lang="en-US"/>
+          </a:p>
+        </p:txBody>
+      </p:sp>
+      <p:pic>
+        <p:nvPicPr>
+          <p:cNvPr id="4" name="Picture 3">
+            <a:extLst>
+              <a:ext uri="{FF2B5EF4-FFF2-40B4-BE49-F238E27FC236}">
+                <a16:creationId xmlns:a16="http://schemas.microsoft.com/office/drawing/2014/main" id="{2A7EDCD5-D754-9456-32CC-58EBBB82D373}"/>
+              </a:ext>
+            </a:extLst>
+          </p:cNvPr>
+          <p:cNvPicPr>
+            <a:picLocks noChangeAspect="1"/>
+          </p:cNvPicPr>
+          <p:nvPr/>
+        </p:nvPicPr>
+        <p:blipFill>
+          <a:blip r:embed="rId2"/>
+          <a:stretch>
+            <a:fillRect/>
+          </a:stretch>
+        </p:blipFill>
+        <p:spPr>
+          <a:xfrm>
+            <a:off x="2737969" y="1957182"/>
+            <a:ext cx="6716062" cy="2943636"/>
+          </a:xfrm>
+          <a:prstGeom prst="rect">
+            <a:avLst/>
+          </a:prstGeom>
+        </p:spPr>
+      </p:pic>
+    </p:spTree>
+    <p:extLst>
+      <p:ext uri="{BB962C8B-B14F-4D97-AF65-F5344CB8AC3E}">
+        <p14:creationId xmlns:p14="http://schemas.microsoft.com/office/powerpoint/2010/main" val="1616658189"/>
+      </p:ext>
+    </p:extLst>
+  </p:cSld>
+  <p:clrMapOvr>
+    <a:masterClrMapping/>
+  </p:clrMapOvr>
+</p:sld>
+</file>
+
+<file path=ppt/slides/slide18.xml><?xml version="1.0" encoding="utf-8"?>
+<p:sld xmlns:a="http://schemas.openxmlformats.org/drawingml/2006/main" xmlns:r="http://schemas.openxmlformats.org/officeDocument/2006/relationships" xmlns:p="http://schemas.openxmlformats.org/presentationml/2006/main">
+  <p:cSld>
+    <p:spTree>
+      <p:nvGrpSpPr>
+        <p:cNvPr id="1" name=""/>
+        <p:cNvGrpSpPr/>
+        <p:nvPr/>
+      </p:nvGrpSpPr>
+      <p:grpSpPr>
+        <a:xfrm>
+          <a:off x="0" y="0"/>
+          <a:ext cx="0" cy="0"/>
+          <a:chOff x="0" y="0"/>
+          <a:chExt cx="0" cy="0"/>
+        </a:xfrm>
+      </p:grpSpPr>
+      <p:sp>
+        <p:nvSpPr>
+          <p:cNvPr id="5" name="TextBox 4">
+            <a:extLst>
+              <a:ext uri="{FF2B5EF4-FFF2-40B4-BE49-F238E27FC236}">
+                <a16:creationId xmlns:a16="http://schemas.microsoft.com/office/drawing/2014/main" id="{44085D18-8669-A35D-D918-DDFE81A3579D}"/>
+              </a:ext>
+            </a:extLst>
+          </p:cNvPr>
+          <p:cNvSpPr txBox="1"/>
+          <p:nvPr/>
+        </p:nvSpPr>
+        <p:spPr>
+          <a:xfrm>
+            <a:off x="3044824" y="0"/>
+            <a:ext cx="6810375" cy="830997"/>
+          </a:xfrm>
+          <a:prstGeom prst="rect">
+            <a:avLst/>
+          </a:prstGeom>
+          <a:noFill/>
+        </p:spPr>
+        <p:txBody>
+          <a:bodyPr wrap="square">
+            <a:spAutoFit/>
+          </a:bodyPr>
+          <a:lstStyle/>
+          <a:p>
+            <a:pPr algn="ctr"/>
+            <a:r>
+              <a:rPr lang="en-US" sz="4800" b="1" i="0" dirty="0">
+                <a:ln w="22225">
+                  <a:solidFill>
+                    <a:schemeClr val="accent2"/>
+                  </a:solidFill>
+                  <a:prstDash val="solid"/>
+                </a:ln>
+                <a:solidFill>
+                  <a:schemeClr val="accent2">
+                    <a:lumMod val="40000"/>
+                    <a:lumOff val="60000"/>
+                  </a:schemeClr>
+                </a:solidFill>
+                <a:highlight>
+                  <a:srgbClr val="FFFFFF"/>
+                </a:highlight>
+                <a:latin typeface="Wotfard"/>
+              </a:rPr>
+              <a:t>Functions In SQL Server</a:t>
+            </a:r>
+          </a:p>
+        </p:txBody>
+      </p:sp>
+      <p:sp>
+        <p:nvSpPr>
+          <p:cNvPr id="9" name="AutoShape 2" descr="sqlserver-page">
+            <a:extLst>
+              <a:ext uri="{FF2B5EF4-FFF2-40B4-BE49-F238E27FC236}">
+                <a16:creationId xmlns:a16="http://schemas.microsoft.com/office/drawing/2014/main" id="{391C2F74-10A7-C19E-24EE-7E95D18FFE1C}"/>
+              </a:ext>
+            </a:extLst>
+          </p:cNvPr>
+          <p:cNvSpPr>
+            <a:spLocks noChangeAspect="1" noChangeArrowheads="1"/>
+          </p:cNvSpPr>
+          <p:nvPr/>
+        </p:nvSpPr>
+        <p:spPr bwMode="auto">
+          <a:xfrm>
+            <a:off x="5943600" y="3276600"/>
+            <a:ext cx="304800" cy="304800"/>
+          </a:xfrm>
+          <a:prstGeom prst="rect">
+            <a:avLst/>
+          </a:prstGeom>
+          <a:noFill/>
+          <a:extLst>
+            <a:ext uri="{909E8E84-426E-40DD-AFC4-6F175D3DCCD1}">
+              <a14:hiddenFill xmlns:a14="http://schemas.microsoft.com/office/drawing/2010/main">
+                <a:solidFill>
+                  <a:srgbClr val="FFFFFF"/>
+                </a:solidFill>
+              </a14:hiddenFill>
+            </a:ext>
+          </a:extLst>
+        </p:spPr>
+        <p:txBody>
+          <a:bodyPr vert="horz" wrap="square" lIns="91440" tIns="45720" rIns="91440" bIns="45720" numCol="1" anchor="t" anchorCtr="0" compatLnSpc="1">
+            <a:prstTxWarp prst="textNoShape">
+              <a:avLst/>
+            </a:prstTxWarp>
+          </a:bodyPr>
+          <a:lstStyle/>
+          <a:p>
+            <a:endParaRPr lang="en-US"/>
+          </a:p>
+        </p:txBody>
+      </p:sp>
+      <p:pic>
+        <p:nvPicPr>
+          <p:cNvPr id="3" name="Picture 2">
+            <a:extLst>
+              <a:ext uri="{FF2B5EF4-FFF2-40B4-BE49-F238E27FC236}">
+                <a16:creationId xmlns:a16="http://schemas.microsoft.com/office/drawing/2014/main" id="{7C6CB36F-1C98-6EC8-AFAB-EAD1A1C2B551}"/>
+              </a:ext>
+            </a:extLst>
+          </p:cNvPr>
+          <p:cNvPicPr>
+            <a:picLocks noChangeAspect="1"/>
+          </p:cNvPicPr>
+          <p:nvPr/>
+        </p:nvPicPr>
+        <p:blipFill>
+          <a:blip r:embed="rId2"/>
+          <a:stretch>
+            <a:fillRect/>
+          </a:stretch>
+        </p:blipFill>
+        <p:spPr>
+          <a:xfrm>
+            <a:off x="2980890" y="1179133"/>
+            <a:ext cx="6230219" cy="5439534"/>
+          </a:xfrm>
+          <a:prstGeom prst="rect">
+            <a:avLst/>
+          </a:prstGeom>
+        </p:spPr>
+      </p:pic>
+    </p:spTree>
+    <p:extLst>
+      <p:ext uri="{BB962C8B-B14F-4D97-AF65-F5344CB8AC3E}">
+        <p14:creationId xmlns:p14="http://schemas.microsoft.com/office/powerpoint/2010/main" val="130086871"/>
+      </p:ext>
+    </p:extLst>
+  </p:cSld>
+  <p:clrMapOvr>
+    <a:masterClrMapping/>
+  </p:clrMapOvr>
+</p:sld>
+</file>
+
+<file path=ppt/slides/slide19.xml><?xml version="1.0" encoding="utf-8"?>
+<p:sld xmlns:a="http://schemas.openxmlformats.org/drawingml/2006/main" xmlns:r="http://schemas.openxmlformats.org/officeDocument/2006/relationships" xmlns:p="http://schemas.openxmlformats.org/presentationml/2006/main">
+  <p:cSld>
+    <p:spTree>
+      <p:nvGrpSpPr>
+        <p:cNvPr id="1" name=""/>
+        <p:cNvGrpSpPr/>
+        <p:nvPr/>
+      </p:nvGrpSpPr>
+      <p:grpSpPr>
+        <a:xfrm>
+          <a:off x="0" y="0"/>
+          <a:ext cx="0" cy="0"/>
+          <a:chOff x="0" y="0"/>
+          <a:chExt cx="0" cy="0"/>
+        </a:xfrm>
+      </p:grpSpPr>
+      <p:sp>
+        <p:nvSpPr>
+          <p:cNvPr id="5" name="TextBox 4">
+            <a:extLst>
+              <a:ext uri="{FF2B5EF4-FFF2-40B4-BE49-F238E27FC236}">
+                <a16:creationId xmlns:a16="http://schemas.microsoft.com/office/drawing/2014/main" id="{44085D18-8669-A35D-D918-DDFE81A3579D}"/>
+              </a:ext>
+            </a:extLst>
+          </p:cNvPr>
+          <p:cNvSpPr txBox="1"/>
+          <p:nvPr/>
+        </p:nvSpPr>
+        <p:spPr>
+          <a:xfrm>
+            <a:off x="3044824" y="0"/>
+            <a:ext cx="6810375" cy="830997"/>
+          </a:xfrm>
+          <a:prstGeom prst="rect">
+            <a:avLst/>
+          </a:prstGeom>
+          <a:noFill/>
+        </p:spPr>
+        <p:txBody>
+          <a:bodyPr wrap="square">
+            <a:spAutoFit/>
+          </a:bodyPr>
+          <a:lstStyle/>
+          <a:p>
+            <a:pPr algn="ctr"/>
+            <a:r>
+              <a:rPr lang="en-US" sz="4800" b="1" i="0" dirty="0">
+                <a:ln w="22225">
+                  <a:solidFill>
+                    <a:schemeClr val="accent2"/>
+                  </a:solidFill>
+                  <a:prstDash val="solid"/>
+                </a:ln>
+                <a:solidFill>
+                  <a:schemeClr val="accent2">
+                    <a:lumMod val="40000"/>
+                    <a:lumOff val="60000"/>
+                  </a:schemeClr>
+                </a:solidFill>
+                <a:highlight>
+                  <a:srgbClr val="FFFFFF"/>
+                </a:highlight>
+                <a:latin typeface="Wotfard"/>
+              </a:rPr>
+              <a:t>Functions In SQL Server</a:t>
+            </a:r>
+          </a:p>
+        </p:txBody>
+      </p:sp>
+      <p:sp>
+        <p:nvSpPr>
+          <p:cNvPr id="9" name="AutoShape 2" descr="sqlserver-page">
+            <a:extLst>
+              <a:ext uri="{FF2B5EF4-FFF2-40B4-BE49-F238E27FC236}">
+                <a16:creationId xmlns:a16="http://schemas.microsoft.com/office/drawing/2014/main" id="{391C2F74-10A7-C19E-24EE-7E95D18FFE1C}"/>
+              </a:ext>
+            </a:extLst>
+          </p:cNvPr>
+          <p:cNvSpPr>
+            <a:spLocks noChangeAspect="1" noChangeArrowheads="1"/>
+          </p:cNvSpPr>
+          <p:nvPr/>
+        </p:nvSpPr>
+        <p:spPr bwMode="auto">
+          <a:xfrm>
+            <a:off x="5943600" y="3276600"/>
+            <a:ext cx="304800" cy="304800"/>
+          </a:xfrm>
+          <a:prstGeom prst="rect">
+            <a:avLst/>
+          </a:prstGeom>
+          <a:noFill/>
+          <a:extLst>
+            <a:ext uri="{909E8E84-426E-40DD-AFC4-6F175D3DCCD1}">
+              <a14:hiddenFill xmlns:a14="http://schemas.microsoft.com/office/drawing/2010/main">
+                <a:solidFill>
+                  <a:srgbClr val="FFFFFF"/>
+                </a:solidFill>
+              </a14:hiddenFill>
+            </a:ext>
+          </a:extLst>
+        </p:spPr>
+        <p:txBody>
+          <a:bodyPr vert="horz" wrap="square" lIns="91440" tIns="45720" rIns="91440" bIns="45720" numCol="1" anchor="t" anchorCtr="0" compatLnSpc="1">
+            <a:prstTxWarp prst="textNoShape">
+              <a:avLst/>
+            </a:prstTxWarp>
+          </a:bodyPr>
+          <a:lstStyle/>
+          <a:p>
+            <a:endParaRPr lang="en-US"/>
+          </a:p>
+        </p:txBody>
+      </p:sp>
+      <p:pic>
+        <p:nvPicPr>
+          <p:cNvPr id="4" name="Picture 3">
+            <a:extLst>
+              <a:ext uri="{FF2B5EF4-FFF2-40B4-BE49-F238E27FC236}">
+                <a16:creationId xmlns:a16="http://schemas.microsoft.com/office/drawing/2014/main" id="{5D156E7F-9F2E-623F-E4A9-627655A9665B}"/>
+              </a:ext>
+            </a:extLst>
+          </p:cNvPr>
+          <p:cNvPicPr>
+            <a:picLocks noChangeAspect="1"/>
+          </p:cNvPicPr>
+          <p:nvPr/>
+        </p:nvPicPr>
+        <p:blipFill>
+          <a:blip r:embed="rId2"/>
+          <a:stretch>
+            <a:fillRect/>
+          </a:stretch>
+        </p:blipFill>
+        <p:spPr>
+          <a:xfrm>
+            <a:off x="2728442" y="1058464"/>
+            <a:ext cx="6735115" cy="5706271"/>
+          </a:xfrm>
+          <a:prstGeom prst="rect">
+            <a:avLst/>
+          </a:prstGeom>
+        </p:spPr>
+      </p:pic>
+    </p:spTree>
+    <p:extLst>
+      <p:ext uri="{BB962C8B-B14F-4D97-AF65-F5344CB8AC3E}">
+        <p14:creationId xmlns:p14="http://schemas.microsoft.com/office/powerpoint/2010/main" val="2743693609"/>
+      </p:ext>
+    </p:extLst>
+  </p:cSld>
+  <p:clrMapOvr>
+    <a:masterClrMapping/>
+  </p:clrMapOvr>
+</p:sld>
+</file>
+
 <file path=ppt/slides/slide2.xml><?xml version="1.0" encoding="utf-8"?>
 <p:sld xmlns:a="http://schemas.openxmlformats.org/drawingml/2006/main" xmlns:r="http://schemas.openxmlformats.org/officeDocument/2006/relationships" xmlns:p="http://schemas.openxmlformats.org/presentationml/2006/main">
   <p:cSld>
@@ -5068,6 +6227,510 @@
     <p:extLst>
       <p:ext uri="{BB962C8B-B14F-4D97-AF65-F5344CB8AC3E}">
         <p14:creationId xmlns:p14="http://schemas.microsoft.com/office/powerpoint/2010/main" val="2767866686"/>
+      </p:ext>
+    </p:extLst>
+  </p:cSld>
+  <p:clrMapOvr>
+    <a:masterClrMapping/>
+  </p:clrMapOvr>
+</p:sld>
+</file>
+
+<file path=ppt/slides/slide20.xml><?xml version="1.0" encoding="utf-8"?>
+<p:sld xmlns:a="http://schemas.openxmlformats.org/drawingml/2006/main" xmlns:r="http://schemas.openxmlformats.org/officeDocument/2006/relationships" xmlns:p="http://schemas.openxmlformats.org/presentationml/2006/main">
+  <p:cSld>
+    <p:spTree>
+      <p:nvGrpSpPr>
+        <p:cNvPr id="1" name=""/>
+        <p:cNvGrpSpPr/>
+        <p:nvPr/>
+      </p:nvGrpSpPr>
+      <p:grpSpPr>
+        <a:xfrm>
+          <a:off x="0" y="0"/>
+          <a:ext cx="0" cy="0"/>
+          <a:chOff x="0" y="0"/>
+          <a:chExt cx="0" cy="0"/>
+        </a:xfrm>
+      </p:grpSpPr>
+      <p:sp>
+        <p:nvSpPr>
+          <p:cNvPr id="5" name="TextBox 4">
+            <a:extLst>
+              <a:ext uri="{FF2B5EF4-FFF2-40B4-BE49-F238E27FC236}">
+                <a16:creationId xmlns:a16="http://schemas.microsoft.com/office/drawing/2014/main" id="{44085D18-8669-A35D-D918-DDFE81A3579D}"/>
+              </a:ext>
+            </a:extLst>
+          </p:cNvPr>
+          <p:cNvSpPr txBox="1"/>
+          <p:nvPr/>
+        </p:nvSpPr>
+        <p:spPr>
+          <a:xfrm>
+            <a:off x="3044824" y="0"/>
+            <a:ext cx="6810375" cy="830997"/>
+          </a:xfrm>
+          <a:prstGeom prst="rect">
+            <a:avLst/>
+          </a:prstGeom>
+          <a:noFill/>
+        </p:spPr>
+        <p:txBody>
+          <a:bodyPr wrap="square">
+            <a:spAutoFit/>
+          </a:bodyPr>
+          <a:lstStyle/>
+          <a:p>
+            <a:pPr algn="ctr"/>
+            <a:r>
+              <a:rPr lang="en-US" sz="4800" b="1" i="0" dirty="0">
+                <a:ln w="22225">
+                  <a:solidFill>
+                    <a:schemeClr val="accent2"/>
+                  </a:solidFill>
+                  <a:prstDash val="solid"/>
+                </a:ln>
+                <a:solidFill>
+                  <a:schemeClr val="accent2">
+                    <a:lumMod val="40000"/>
+                    <a:lumOff val="60000"/>
+                  </a:schemeClr>
+                </a:solidFill>
+                <a:highlight>
+                  <a:srgbClr val="FFFFFF"/>
+                </a:highlight>
+                <a:latin typeface="Wotfard"/>
+              </a:rPr>
+              <a:t>Functions In SQL Server</a:t>
+            </a:r>
+          </a:p>
+        </p:txBody>
+      </p:sp>
+      <p:sp>
+        <p:nvSpPr>
+          <p:cNvPr id="9" name="AutoShape 2" descr="sqlserver-page">
+            <a:extLst>
+              <a:ext uri="{FF2B5EF4-FFF2-40B4-BE49-F238E27FC236}">
+                <a16:creationId xmlns:a16="http://schemas.microsoft.com/office/drawing/2014/main" id="{391C2F74-10A7-C19E-24EE-7E95D18FFE1C}"/>
+              </a:ext>
+            </a:extLst>
+          </p:cNvPr>
+          <p:cNvSpPr>
+            <a:spLocks noChangeAspect="1" noChangeArrowheads="1"/>
+          </p:cNvSpPr>
+          <p:nvPr/>
+        </p:nvSpPr>
+        <p:spPr bwMode="auto">
+          <a:xfrm>
+            <a:off x="5943600" y="3276600"/>
+            <a:ext cx="304800" cy="304800"/>
+          </a:xfrm>
+          <a:prstGeom prst="rect">
+            <a:avLst/>
+          </a:prstGeom>
+          <a:noFill/>
+          <a:extLst>
+            <a:ext uri="{909E8E84-426E-40DD-AFC4-6F175D3DCCD1}">
+              <a14:hiddenFill xmlns:a14="http://schemas.microsoft.com/office/drawing/2010/main">
+                <a:solidFill>
+                  <a:srgbClr val="FFFFFF"/>
+                </a:solidFill>
+              </a14:hiddenFill>
+            </a:ext>
+          </a:extLst>
+        </p:spPr>
+        <p:txBody>
+          <a:bodyPr vert="horz" wrap="square" lIns="91440" tIns="45720" rIns="91440" bIns="45720" numCol="1" anchor="t" anchorCtr="0" compatLnSpc="1">
+            <a:prstTxWarp prst="textNoShape">
+              <a:avLst/>
+            </a:prstTxWarp>
+          </a:bodyPr>
+          <a:lstStyle/>
+          <a:p>
+            <a:endParaRPr lang="en-US"/>
+          </a:p>
+        </p:txBody>
+      </p:sp>
+      <p:pic>
+        <p:nvPicPr>
+          <p:cNvPr id="3" name="Picture 2">
+            <a:extLst>
+              <a:ext uri="{FF2B5EF4-FFF2-40B4-BE49-F238E27FC236}">
+                <a16:creationId xmlns:a16="http://schemas.microsoft.com/office/drawing/2014/main" id="{2A06E2CA-A455-BBB7-FA49-E3E89E5EE664}"/>
+              </a:ext>
+            </a:extLst>
+          </p:cNvPr>
+          <p:cNvPicPr>
+            <a:picLocks noChangeAspect="1"/>
+          </p:cNvPicPr>
+          <p:nvPr/>
+        </p:nvPicPr>
+        <p:blipFill>
+          <a:blip r:embed="rId2"/>
+          <a:stretch>
+            <a:fillRect/>
+          </a:stretch>
+        </p:blipFill>
+        <p:spPr>
+          <a:xfrm>
+            <a:off x="2871337" y="987022"/>
+            <a:ext cx="6449325" cy="5772956"/>
+          </a:xfrm>
+          <a:prstGeom prst="rect">
+            <a:avLst/>
+          </a:prstGeom>
+        </p:spPr>
+      </p:pic>
+    </p:spTree>
+    <p:extLst>
+      <p:ext uri="{BB962C8B-B14F-4D97-AF65-F5344CB8AC3E}">
+        <p14:creationId xmlns:p14="http://schemas.microsoft.com/office/powerpoint/2010/main" val="1242729059"/>
+      </p:ext>
+    </p:extLst>
+  </p:cSld>
+  <p:clrMapOvr>
+    <a:masterClrMapping/>
+  </p:clrMapOvr>
+</p:sld>
+</file>
+
+<file path=ppt/slides/slide21.xml><?xml version="1.0" encoding="utf-8"?>
+<p:sld xmlns:a="http://schemas.openxmlformats.org/drawingml/2006/main" xmlns:r="http://schemas.openxmlformats.org/officeDocument/2006/relationships" xmlns:p="http://schemas.openxmlformats.org/presentationml/2006/main">
+  <p:cSld>
+    <p:spTree>
+      <p:nvGrpSpPr>
+        <p:cNvPr id="1" name=""/>
+        <p:cNvGrpSpPr/>
+        <p:nvPr/>
+      </p:nvGrpSpPr>
+      <p:grpSpPr>
+        <a:xfrm>
+          <a:off x="0" y="0"/>
+          <a:ext cx="0" cy="0"/>
+          <a:chOff x="0" y="0"/>
+          <a:chExt cx="0" cy="0"/>
+        </a:xfrm>
+      </p:grpSpPr>
+      <p:sp>
+        <p:nvSpPr>
+          <p:cNvPr id="5" name="TextBox 4">
+            <a:extLst>
+              <a:ext uri="{FF2B5EF4-FFF2-40B4-BE49-F238E27FC236}">
+                <a16:creationId xmlns:a16="http://schemas.microsoft.com/office/drawing/2014/main" id="{44085D18-8669-A35D-D918-DDFE81A3579D}"/>
+              </a:ext>
+            </a:extLst>
+          </p:cNvPr>
+          <p:cNvSpPr txBox="1"/>
+          <p:nvPr/>
+        </p:nvSpPr>
+        <p:spPr>
+          <a:xfrm>
+            <a:off x="3044824" y="0"/>
+            <a:ext cx="6810375" cy="830997"/>
+          </a:xfrm>
+          <a:prstGeom prst="rect">
+            <a:avLst/>
+          </a:prstGeom>
+          <a:noFill/>
+        </p:spPr>
+        <p:txBody>
+          <a:bodyPr wrap="square">
+            <a:spAutoFit/>
+          </a:bodyPr>
+          <a:lstStyle/>
+          <a:p>
+            <a:pPr algn="ctr"/>
+            <a:r>
+              <a:rPr lang="en-US" sz="4800" b="1" i="0" dirty="0">
+                <a:ln w="22225">
+                  <a:solidFill>
+                    <a:schemeClr val="accent2"/>
+                  </a:solidFill>
+                  <a:prstDash val="solid"/>
+                </a:ln>
+                <a:solidFill>
+                  <a:schemeClr val="accent2">
+                    <a:lumMod val="40000"/>
+                    <a:lumOff val="60000"/>
+                  </a:schemeClr>
+                </a:solidFill>
+                <a:highlight>
+                  <a:srgbClr val="FFFFFF"/>
+                </a:highlight>
+                <a:latin typeface="Wotfard"/>
+              </a:rPr>
+              <a:t>Functions In SQL Server</a:t>
+            </a:r>
+          </a:p>
+        </p:txBody>
+      </p:sp>
+      <p:sp>
+        <p:nvSpPr>
+          <p:cNvPr id="9" name="AutoShape 2" descr="sqlserver-page">
+            <a:extLst>
+              <a:ext uri="{FF2B5EF4-FFF2-40B4-BE49-F238E27FC236}">
+                <a16:creationId xmlns:a16="http://schemas.microsoft.com/office/drawing/2014/main" id="{391C2F74-10A7-C19E-24EE-7E95D18FFE1C}"/>
+              </a:ext>
+            </a:extLst>
+          </p:cNvPr>
+          <p:cNvSpPr>
+            <a:spLocks noChangeAspect="1" noChangeArrowheads="1"/>
+          </p:cNvSpPr>
+          <p:nvPr/>
+        </p:nvSpPr>
+        <p:spPr bwMode="auto">
+          <a:xfrm>
+            <a:off x="5943600" y="3276600"/>
+            <a:ext cx="304800" cy="304800"/>
+          </a:xfrm>
+          <a:prstGeom prst="rect">
+            <a:avLst/>
+          </a:prstGeom>
+          <a:noFill/>
+          <a:extLst>
+            <a:ext uri="{909E8E84-426E-40DD-AFC4-6F175D3DCCD1}">
+              <a14:hiddenFill xmlns:a14="http://schemas.microsoft.com/office/drawing/2010/main">
+                <a:solidFill>
+                  <a:srgbClr val="FFFFFF"/>
+                </a:solidFill>
+              </a14:hiddenFill>
+            </a:ext>
+          </a:extLst>
+        </p:spPr>
+        <p:txBody>
+          <a:bodyPr vert="horz" wrap="square" lIns="91440" tIns="45720" rIns="91440" bIns="45720" numCol="1" anchor="t" anchorCtr="0" compatLnSpc="1">
+            <a:prstTxWarp prst="textNoShape">
+              <a:avLst/>
+            </a:prstTxWarp>
+          </a:bodyPr>
+          <a:lstStyle/>
+          <a:p>
+            <a:endParaRPr lang="en-US"/>
+          </a:p>
+        </p:txBody>
+      </p:sp>
+      <p:pic>
+        <p:nvPicPr>
+          <p:cNvPr id="4" name="Picture 3">
+            <a:extLst>
+              <a:ext uri="{FF2B5EF4-FFF2-40B4-BE49-F238E27FC236}">
+                <a16:creationId xmlns:a16="http://schemas.microsoft.com/office/drawing/2014/main" id="{BF49E819-C1E1-CD93-F9BB-BC7271B3A81A}"/>
+              </a:ext>
+            </a:extLst>
+          </p:cNvPr>
+          <p:cNvPicPr>
+            <a:picLocks noChangeAspect="1"/>
+          </p:cNvPicPr>
+          <p:nvPr/>
+        </p:nvPicPr>
+        <p:blipFill>
+          <a:blip r:embed="rId3"/>
+          <a:stretch>
+            <a:fillRect/>
+          </a:stretch>
+        </p:blipFill>
+        <p:spPr>
+          <a:xfrm>
+            <a:off x="3052337" y="1098170"/>
+            <a:ext cx="6087325" cy="5449060"/>
+          </a:xfrm>
+          <a:prstGeom prst="rect">
+            <a:avLst/>
+          </a:prstGeom>
+        </p:spPr>
+      </p:pic>
+    </p:spTree>
+    <p:extLst>
+      <p:ext uri="{BB962C8B-B14F-4D97-AF65-F5344CB8AC3E}">
+        <p14:creationId xmlns:p14="http://schemas.microsoft.com/office/powerpoint/2010/main" val="3948160393"/>
+      </p:ext>
+    </p:extLst>
+  </p:cSld>
+  <p:clrMapOvr>
+    <a:masterClrMapping/>
+  </p:clrMapOvr>
+</p:sld>
+</file>
+
+<file path=ppt/slides/slide22.xml><?xml version="1.0" encoding="utf-8"?>
+<p:sld xmlns:a="http://schemas.openxmlformats.org/drawingml/2006/main" xmlns:r="http://schemas.openxmlformats.org/officeDocument/2006/relationships" xmlns:p="http://schemas.openxmlformats.org/presentationml/2006/main">
+  <p:cSld>
+    <p:spTree>
+      <p:nvGrpSpPr>
+        <p:cNvPr id="1" name=""/>
+        <p:cNvGrpSpPr/>
+        <p:nvPr/>
+      </p:nvGrpSpPr>
+      <p:grpSpPr>
+        <a:xfrm>
+          <a:off x="0" y="0"/>
+          <a:ext cx="0" cy="0"/>
+          <a:chOff x="0" y="0"/>
+          <a:chExt cx="0" cy="0"/>
+        </a:xfrm>
+      </p:grpSpPr>
+      <p:sp>
+        <p:nvSpPr>
+          <p:cNvPr id="5" name="TextBox 4">
+            <a:extLst>
+              <a:ext uri="{FF2B5EF4-FFF2-40B4-BE49-F238E27FC236}">
+                <a16:creationId xmlns:a16="http://schemas.microsoft.com/office/drawing/2014/main" id="{44085D18-8669-A35D-D918-DDFE81A3579D}"/>
+              </a:ext>
+            </a:extLst>
+          </p:cNvPr>
+          <p:cNvSpPr txBox="1"/>
+          <p:nvPr/>
+        </p:nvSpPr>
+        <p:spPr>
+          <a:xfrm>
+            <a:off x="3044824" y="0"/>
+            <a:ext cx="6810375" cy="830997"/>
+          </a:xfrm>
+          <a:prstGeom prst="rect">
+            <a:avLst/>
+          </a:prstGeom>
+          <a:noFill/>
+        </p:spPr>
+        <p:txBody>
+          <a:bodyPr wrap="square">
+            <a:spAutoFit/>
+          </a:bodyPr>
+          <a:lstStyle/>
+          <a:p>
+            <a:pPr algn="ctr"/>
+            <a:r>
+              <a:rPr lang="en-US" sz="4800" b="1" i="0" dirty="0">
+                <a:ln w="22225">
+                  <a:solidFill>
+                    <a:schemeClr val="accent2"/>
+                  </a:solidFill>
+                  <a:prstDash val="solid"/>
+                </a:ln>
+                <a:solidFill>
+                  <a:schemeClr val="accent2">
+                    <a:lumMod val="40000"/>
+                    <a:lumOff val="60000"/>
+                  </a:schemeClr>
+                </a:solidFill>
+                <a:highlight>
+                  <a:srgbClr val="FFFFFF"/>
+                </a:highlight>
+                <a:latin typeface="Wotfard"/>
+              </a:rPr>
+              <a:t>Functions In SQL Server</a:t>
+            </a:r>
+          </a:p>
+        </p:txBody>
+      </p:sp>
+      <p:sp>
+        <p:nvSpPr>
+          <p:cNvPr id="9" name="AutoShape 2" descr="sqlserver-page">
+            <a:extLst>
+              <a:ext uri="{FF2B5EF4-FFF2-40B4-BE49-F238E27FC236}">
+                <a16:creationId xmlns:a16="http://schemas.microsoft.com/office/drawing/2014/main" id="{391C2F74-10A7-C19E-24EE-7E95D18FFE1C}"/>
+              </a:ext>
+            </a:extLst>
+          </p:cNvPr>
+          <p:cNvSpPr>
+            <a:spLocks noChangeAspect="1" noChangeArrowheads="1"/>
+          </p:cNvSpPr>
+          <p:nvPr/>
+        </p:nvSpPr>
+        <p:spPr bwMode="auto">
+          <a:xfrm>
+            <a:off x="5943600" y="3276600"/>
+            <a:ext cx="304800" cy="304800"/>
+          </a:xfrm>
+          <a:prstGeom prst="rect">
+            <a:avLst/>
+          </a:prstGeom>
+          <a:noFill/>
+          <a:extLst>
+            <a:ext uri="{909E8E84-426E-40DD-AFC4-6F175D3DCCD1}">
+              <a14:hiddenFill xmlns:a14="http://schemas.microsoft.com/office/drawing/2010/main">
+                <a:solidFill>
+                  <a:srgbClr val="FFFFFF"/>
+                </a:solidFill>
+              </a14:hiddenFill>
+            </a:ext>
+          </a:extLst>
+        </p:spPr>
+        <p:txBody>
+          <a:bodyPr vert="horz" wrap="square" lIns="91440" tIns="45720" rIns="91440" bIns="45720" numCol="1" anchor="t" anchorCtr="0" compatLnSpc="1">
+            <a:prstTxWarp prst="textNoShape">
+              <a:avLst/>
+            </a:prstTxWarp>
+          </a:bodyPr>
+          <a:lstStyle/>
+          <a:p>
+            <a:endParaRPr lang="en-US"/>
+          </a:p>
+        </p:txBody>
+      </p:sp>
+      <p:pic>
+        <p:nvPicPr>
+          <p:cNvPr id="3" name="Picture 2">
+            <a:extLst>
+              <a:ext uri="{FF2B5EF4-FFF2-40B4-BE49-F238E27FC236}">
+                <a16:creationId xmlns:a16="http://schemas.microsoft.com/office/drawing/2014/main" id="{753F46C5-C3C0-86D5-11FE-E89498EB4FA2}"/>
+              </a:ext>
+            </a:extLst>
+          </p:cNvPr>
+          <p:cNvPicPr>
+            <a:picLocks noChangeAspect="1"/>
+          </p:cNvPicPr>
+          <p:nvPr/>
+        </p:nvPicPr>
+        <p:blipFill>
+          <a:blip r:embed="rId3"/>
+          <a:stretch>
+            <a:fillRect/>
+          </a:stretch>
+        </p:blipFill>
+        <p:spPr>
+          <a:xfrm>
+            <a:off x="2904679" y="830997"/>
+            <a:ext cx="6382641" cy="2991267"/>
+          </a:xfrm>
+          <a:prstGeom prst="rect">
+            <a:avLst/>
+          </a:prstGeom>
+        </p:spPr>
+      </p:pic>
+      <p:pic>
+        <p:nvPicPr>
+          <p:cNvPr id="7" name="Picture 6">
+            <a:extLst>
+              <a:ext uri="{FF2B5EF4-FFF2-40B4-BE49-F238E27FC236}">
+                <a16:creationId xmlns:a16="http://schemas.microsoft.com/office/drawing/2014/main" id="{A81A28F6-0F55-68CE-F300-2C660D8380AE}"/>
+              </a:ext>
+            </a:extLst>
+          </p:cNvPr>
+          <p:cNvPicPr>
+            <a:picLocks noChangeAspect="1"/>
+          </p:cNvPicPr>
+          <p:nvPr/>
+        </p:nvPicPr>
+        <p:blipFill>
+          <a:blip r:embed="rId4"/>
+          <a:stretch>
+            <a:fillRect/>
+          </a:stretch>
+        </p:blipFill>
+        <p:spPr>
+          <a:xfrm>
+            <a:off x="2842757" y="3822264"/>
+            <a:ext cx="6506483" cy="2743583"/>
+          </a:xfrm>
+          <a:prstGeom prst="rect">
+            <a:avLst/>
+          </a:prstGeom>
+        </p:spPr>
+      </p:pic>
+    </p:spTree>
+    <p:extLst>
+      <p:ext uri="{BB962C8B-B14F-4D97-AF65-F5344CB8AC3E}">
+        <p14:creationId xmlns:p14="http://schemas.microsoft.com/office/powerpoint/2010/main" val="2343976260"/>
       </p:ext>
     </p:extLst>
   </p:cSld>
@@ -8249,4 +9912,299 @@
     </a:ext>
   </a:extLst>
 </a:theme>
+</file>
+
+<file path=ppt/theme/theme2.xml><?xml version="1.0" encoding="utf-8"?>
+<a:theme xmlns:a="http://schemas.openxmlformats.org/drawingml/2006/main" name="Office Theme">
+  <a:themeElements>
+    <a:clrScheme name="Office">
+      <a:dk1>
+        <a:sysClr val="windowText" lastClr="000000"/>
+      </a:dk1>
+      <a:lt1>
+        <a:sysClr val="window" lastClr="FFFFFF"/>
+      </a:lt1>
+      <a:dk2>
+        <a:srgbClr val="44546A"/>
+      </a:dk2>
+      <a:lt2>
+        <a:srgbClr val="E7E6E6"/>
+      </a:lt2>
+      <a:accent1>
+        <a:srgbClr val="4472C4"/>
+      </a:accent1>
+      <a:accent2>
+        <a:srgbClr val="ED7D31"/>
+      </a:accent2>
+      <a:accent3>
+        <a:srgbClr val="A5A5A5"/>
+      </a:accent3>
+      <a:accent4>
+        <a:srgbClr val="FFC000"/>
+      </a:accent4>
+      <a:accent5>
+        <a:srgbClr val="5B9BD5"/>
+      </a:accent5>
+      <a:accent6>
+        <a:srgbClr val="70AD47"/>
+      </a:accent6>
+      <a:hlink>
+        <a:srgbClr val="0563C1"/>
+      </a:hlink>
+      <a:folHlink>
+        <a:srgbClr val="954F72"/>
+      </a:folHlink>
+    </a:clrScheme>
+    <a:fontScheme name="Office">
+      <a:majorFont>
+        <a:latin typeface="Calibri Light" panose="020F0302020204030204"/>
+        <a:ea typeface=""/>
+        <a:cs typeface=""/>
+        <a:font script="Jpan" typeface="游ゴシック Light"/>
+        <a:font script="Hang" typeface="맑은 고딕"/>
+        <a:font script="Hans" typeface="等线 Light"/>
+        <a:font script="Hant" typeface="新細明體"/>
+        <a:font script="Arab" typeface="Times New Roman"/>
+        <a:font script="Hebr" typeface="Times New Roman"/>
+        <a:font script="Thai" typeface="Angsana New"/>
+        <a:font script="Ethi" typeface="Nyala"/>
+        <a:font script="Beng" typeface="Vrinda"/>
+        <a:font script="Gujr" typeface="Shruti"/>
+        <a:font script="Khmr" typeface="MoolBoran"/>
+        <a:font script="Knda" typeface="Tunga"/>
+        <a:font script="Guru" typeface="Raavi"/>
+        <a:font script="Cans" typeface="Euphemia"/>
+        <a:font script="Cher" typeface="Plantagenet Cherokee"/>
+        <a:font script="Yiii" typeface="Microsoft Yi Baiti"/>
+        <a:font script="Tibt" typeface="Microsoft Himalaya"/>
+        <a:font script="Thaa" typeface="MV Boli"/>
+        <a:font script="Deva" typeface="Mangal"/>
+        <a:font script="Telu" typeface="Gautami"/>
+        <a:font script="Taml" typeface="Latha"/>
+        <a:font script="Syrc" typeface="Estrangelo Edessa"/>
+        <a:font script="Orya" typeface="Kalinga"/>
+        <a:font script="Mlym" typeface="Kartika"/>
+        <a:font script="Laoo" typeface="DokChampa"/>
+        <a:font script="Sinh" typeface="Iskoola Pota"/>
+        <a:font script="Mong" typeface="Mongolian Baiti"/>
+        <a:font script="Viet" typeface="Times New Roman"/>
+        <a:font script="Uigh" typeface="Microsoft Uighur"/>
+        <a:font script="Geor" typeface="Sylfaen"/>
+        <a:font script="Armn" typeface="Arial"/>
+        <a:font script="Bugi" typeface="Leelawadee UI"/>
+        <a:font script="Bopo" typeface="Microsoft JhengHei"/>
+        <a:font script="Java" typeface="Javanese Text"/>
+        <a:font script="Lisu" typeface="Segoe UI"/>
+        <a:font script="Mymr" typeface="Myanmar Text"/>
+        <a:font script="Nkoo" typeface="Ebrima"/>
+        <a:font script="Olck" typeface="Nirmala UI"/>
+        <a:font script="Osma" typeface="Ebrima"/>
+        <a:font script="Phag" typeface="Phagspa"/>
+        <a:font script="Syrn" typeface="Estrangelo Edessa"/>
+        <a:font script="Syrj" typeface="Estrangelo Edessa"/>
+        <a:font script="Syre" typeface="Estrangelo Edessa"/>
+        <a:font script="Sora" typeface="Nirmala UI"/>
+        <a:font script="Tale" typeface="Microsoft Tai Le"/>
+        <a:font script="Talu" typeface="Microsoft New Tai Lue"/>
+        <a:font script="Tfng" typeface="Ebrima"/>
+      </a:majorFont>
+      <a:minorFont>
+        <a:latin typeface="Calibri" panose="020F0502020204030204"/>
+        <a:ea typeface=""/>
+        <a:cs typeface=""/>
+        <a:font script="Jpan" typeface="游ゴシック"/>
+        <a:font script="Hang" typeface="맑은 고딕"/>
+        <a:font script="Hans" typeface="等线"/>
+        <a:font script="Hant" typeface="新細明體"/>
+        <a:font script="Arab" typeface="Arial"/>
+        <a:font script="Hebr" typeface="Arial"/>
+        <a:font script="Thai" typeface="Cordia New"/>
+        <a:font script="Ethi" typeface="Nyala"/>
+        <a:font script="Beng" typeface="Vrinda"/>
+        <a:font script="Gujr" typeface="Shruti"/>
+        <a:font script="Khmr" typeface="DaunPenh"/>
+        <a:font script="Knda" typeface="Tunga"/>
+        <a:font script="Guru" typeface="Raavi"/>
+        <a:font script="Cans" typeface="Euphemia"/>
+        <a:font script="Cher" typeface="Plantagenet Cherokee"/>
+        <a:font script="Yiii" typeface="Microsoft Yi Baiti"/>
+        <a:font script="Tibt" typeface="Microsoft Himalaya"/>
+        <a:font script="Thaa" typeface="MV Boli"/>
+        <a:font script="Deva" typeface="Mangal"/>
+        <a:font script="Telu" typeface="Gautami"/>
+        <a:font script="Taml" typeface="Latha"/>
+        <a:font script="Syrc" typeface="Estrangelo Edessa"/>
+        <a:font script="Orya" typeface="Kalinga"/>
+        <a:font script="Mlym" typeface="Kartika"/>
+        <a:font script="Laoo" typeface="DokChampa"/>
+        <a:font script="Sinh" typeface="Iskoola Pota"/>
+        <a:font script="Mong" typeface="Mongolian Baiti"/>
+        <a:font script="Viet" typeface="Arial"/>
+        <a:font script="Uigh" typeface="Microsoft Uighur"/>
+        <a:font script="Geor" typeface="Sylfaen"/>
+        <a:font script="Armn" typeface="Arial"/>
+        <a:font script="Bugi" typeface="Leelawadee UI"/>
+        <a:font script="Bopo" typeface="Microsoft JhengHei"/>
+        <a:font script="Java" typeface="Javanese Text"/>
+        <a:font script="Lisu" typeface="Segoe UI"/>
+        <a:font script="Mymr" typeface="Myanmar Text"/>
+        <a:font script="Nkoo" typeface="Ebrima"/>
+        <a:font script="Olck" typeface="Nirmala UI"/>
+        <a:font script="Osma" typeface="Ebrima"/>
+        <a:font script="Phag" typeface="Phagspa"/>
+        <a:font script="Syrn" typeface="Estrangelo Edessa"/>
+        <a:font script="Syrj" typeface="Estrangelo Edessa"/>
+        <a:font script="Syre" typeface="Estrangelo Edessa"/>
+        <a:font script="Sora" typeface="Nirmala UI"/>
+        <a:font script="Tale" typeface="Microsoft Tai Le"/>
+        <a:font script="Talu" typeface="Microsoft New Tai Lue"/>
+        <a:font script="Tfng" typeface="Ebrima"/>
+      </a:minorFont>
+    </a:fontScheme>
+    <a:fmtScheme name="Office">
+      <a:fillStyleLst>
+        <a:solidFill>
+          <a:schemeClr val="phClr"/>
+        </a:solidFill>
+        <a:gradFill rotWithShape="1">
+          <a:gsLst>
+            <a:gs pos="0">
+              <a:schemeClr val="phClr">
+                <a:lumMod val="110000"/>
+                <a:satMod val="105000"/>
+                <a:tint val="67000"/>
+              </a:schemeClr>
+            </a:gs>
+            <a:gs pos="50000">
+              <a:schemeClr val="phClr">
+                <a:lumMod val="105000"/>
+                <a:satMod val="103000"/>
+                <a:tint val="73000"/>
+              </a:schemeClr>
+            </a:gs>
+            <a:gs pos="100000">
+              <a:schemeClr val="phClr">
+                <a:lumMod val="105000"/>
+                <a:satMod val="109000"/>
+                <a:tint val="81000"/>
+              </a:schemeClr>
+            </a:gs>
+          </a:gsLst>
+          <a:lin ang="5400000" scaled="0"/>
+        </a:gradFill>
+        <a:gradFill rotWithShape="1">
+          <a:gsLst>
+            <a:gs pos="0">
+              <a:schemeClr val="phClr">
+                <a:satMod val="103000"/>
+                <a:lumMod val="102000"/>
+                <a:tint val="94000"/>
+              </a:schemeClr>
+            </a:gs>
+            <a:gs pos="50000">
+              <a:schemeClr val="phClr">
+                <a:satMod val="110000"/>
+                <a:lumMod val="100000"/>
+                <a:shade val="100000"/>
+              </a:schemeClr>
+            </a:gs>
+            <a:gs pos="100000">
+              <a:schemeClr val="phClr">
+                <a:lumMod val="99000"/>
+                <a:satMod val="120000"/>
+                <a:shade val="78000"/>
+              </a:schemeClr>
+            </a:gs>
+          </a:gsLst>
+          <a:lin ang="5400000" scaled="0"/>
+        </a:gradFill>
+      </a:fillStyleLst>
+      <a:lnStyleLst>
+        <a:ln w="6350" cap="flat" cmpd="sng" algn="ctr">
+          <a:solidFill>
+            <a:schemeClr val="phClr"/>
+          </a:solidFill>
+          <a:prstDash val="solid"/>
+          <a:miter lim="800000"/>
+        </a:ln>
+        <a:ln w="12700" cap="flat" cmpd="sng" algn="ctr">
+          <a:solidFill>
+            <a:schemeClr val="phClr"/>
+          </a:solidFill>
+          <a:prstDash val="solid"/>
+          <a:miter lim="800000"/>
+        </a:ln>
+        <a:ln w="19050" cap="flat" cmpd="sng" algn="ctr">
+          <a:solidFill>
+            <a:schemeClr val="phClr"/>
+          </a:solidFill>
+          <a:prstDash val="solid"/>
+          <a:miter lim="800000"/>
+        </a:ln>
+      </a:lnStyleLst>
+      <a:effectStyleLst>
+        <a:effectStyle>
+          <a:effectLst/>
+        </a:effectStyle>
+        <a:effectStyle>
+          <a:effectLst/>
+        </a:effectStyle>
+        <a:effectStyle>
+          <a:effectLst>
+            <a:outerShdw blurRad="57150" dist="19050" dir="5400000" algn="ctr" rotWithShape="0">
+              <a:srgbClr val="000000">
+                <a:alpha val="63000"/>
+              </a:srgbClr>
+            </a:outerShdw>
+          </a:effectLst>
+        </a:effectStyle>
+      </a:effectStyleLst>
+      <a:bgFillStyleLst>
+        <a:solidFill>
+          <a:schemeClr val="phClr"/>
+        </a:solidFill>
+        <a:solidFill>
+          <a:schemeClr val="phClr">
+            <a:tint val="95000"/>
+            <a:satMod val="170000"/>
+          </a:schemeClr>
+        </a:solidFill>
+        <a:gradFill rotWithShape="1">
+          <a:gsLst>
+            <a:gs pos="0">
+              <a:schemeClr val="phClr">
+                <a:tint val="93000"/>
+                <a:satMod val="150000"/>
+                <a:shade val="98000"/>
+                <a:lumMod val="102000"/>
+              </a:schemeClr>
+            </a:gs>
+            <a:gs pos="50000">
+              <a:schemeClr val="phClr">
+                <a:tint val="98000"/>
+                <a:satMod val="130000"/>
+                <a:shade val="90000"/>
+                <a:lumMod val="103000"/>
+              </a:schemeClr>
+            </a:gs>
+            <a:gs pos="100000">
+              <a:schemeClr val="phClr">
+                <a:shade val="63000"/>
+                <a:satMod val="120000"/>
+              </a:schemeClr>
+            </a:gs>
+          </a:gsLst>
+          <a:lin ang="5400000" scaled="0"/>
+        </a:gradFill>
+      </a:bgFillStyleLst>
+    </a:fmtScheme>
+  </a:themeElements>
+  <a:objectDefaults/>
+  <a:extraClrSchemeLst/>
+  <a:extLst>
+    <a:ext uri="{05A4C25C-085E-4340-85A3-A5531E510DB2}">
+      <thm15:themeFamily xmlns:thm15="http://schemas.microsoft.com/office/thememl/2012/main" name="Office Theme" id="{62F939B6-93AF-4DB8-9C6B-D6C7DFDC589F}" vid="{4A3C46E8-61CC-4603-A589-7422A47A8E4A}"/>
+    </a:ext>
+  </a:extLst>
+</a:theme>
 </file>
</xml_diff>

<commit_message>
function in sql server
</commit_message>
<xml_diff>
--- a/SQL_SERVER/INTRODUCTION_TO_SQL(4) (function).pptx
+++ b/SQL_SERVER/INTRODUCTION_TO_SQL(4) (function).pptx
@@ -5,7 +5,7 @@
     <p:sldMasterId id="2147483878" r:id="rId1"/>
   </p:sldMasterIdLst>
   <p:notesMasterIdLst>
-    <p:notesMasterId r:id="rId24"/>
+    <p:notesMasterId r:id="rId28"/>
   </p:notesMasterIdLst>
   <p:sldIdLst>
     <p:sldId id="256" r:id="rId2"/>
@@ -18,18 +18,22 @@
     <p:sldId id="303" r:id="rId9"/>
     <p:sldId id="304" r:id="rId10"/>
     <p:sldId id="305" r:id="rId11"/>
-    <p:sldId id="306" r:id="rId12"/>
-    <p:sldId id="307" r:id="rId13"/>
-    <p:sldId id="308" r:id="rId14"/>
-    <p:sldId id="309" r:id="rId15"/>
-    <p:sldId id="310" r:id="rId16"/>
-    <p:sldId id="311" r:id="rId17"/>
-    <p:sldId id="312" r:id="rId18"/>
-    <p:sldId id="313" r:id="rId19"/>
-    <p:sldId id="314" r:id="rId20"/>
-    <p:sldId id="315" r:id="rId21"/>
-    <p:sldId id="316" r:id="rId22"/>
-    <p:sldId id="317" r:id="rId23"/>
+    <p:sldId id="318" r:id="rId12"/>
+    <p:sldId id="319" r:id="rId13"/>
+    <p:sldId id="320" r:id="rId14"/>
+    <p:sldId id="321" r:id="rId15"/>
+    <p:sldId id="306" r:id="rId16"/>
+    <p:sldId id="307" r:id="rId17"/>
+    <p:sldId id="308" r:id="rId18"/>
+    <p:sldId id="309" r:id="rId19"/>
+    <p:sldId id="310" r:id="rId20"/>
+    <p:sldId id="311" r:id="rId21"/>
+    <p:sldId id="312" r:id="rId22"/>
+    <p:sldId id="313" r:id="rId23"/>
+    <p:sldId id="314" r:id="rId24"/>
+    <p:sldId id="315" r:id="rId25"/>
+    <p:sldId id="316" r:id="rId26"/>
+    <p:sldId id="317" r:id="rId27"/>
   </p:sldIdLst>
   <p:sldSz cx="12192000" cy="6858000"/>
   <p:notesSz cx="6858000" cy="9144000"/>
@@ -218,7 +222,7 @@
           <a:p>
             <a:fld id="{3A238AB8-A959-4BA8-A1EE-E4C53C860245}" type="datetimeFigureOut">
               <a:rPr lang="en-US" smtClean="0"/>
-              <a:t>7/9/2024</a:t>
+              <a:t>7/10/2024</a:t>
             </a:fld>
             <a:endParaRPr lang="en-US"/>
           </a:p>
@@ -550,7 +554,7 @@
           <a:p>
             <a:fld id="{CEF2BC59-7490-4817-8F62-DD4EFB08573F}" type="slidenum">
               <a:rPr lang="en-US" smtClean="0"/>
-              <a:t>21</a:t>
+              <a:t>25</a:t>
             </a:fld>
             <a:endParaRPr lang="en-US"/>
           </a:p>
@@ -634,7 +638,7 @@
           <a:p>
             <a:fld id="{CEF2BC59-7490-4817-8F62-DD4EFB08573F}" type="slidenum">
               <a:rPr lang="en-US" smtClean="0"/>
-              <a:t>22</a:t>
+              <a:t>26</a:t>
             </a:fld>
             <a:endParaRPr lang="en-US"/>
           </a:p>
@@ -847,7 +851,7 @@
           <a:p>
             <a:fld id="{F0D60A6E-7201-4A4D-A930-2F88FE528610}" type="datetimeFigureOut">
               <a:rPr lang="en-US" smtClean="0"/>
-              <a:t>7/9/2024</a:t>
+              <a:t>7/10/2024</a:t>
             </a:fld>
             <a:endParaRPr lang="en-US"/>
           </a:p>
@@ -1017,7 +1021,7 @@
           <a:p>
             <a:fld id="{F0D60A6E-7201-4A4D-A930-2F88FE528610}" type="datetimeFigureOut">
               <a:rPr lang="en-US" smtClean="0"/>
-              <a:t>7/9/2024</a:t>
+              <a:t>7/10/2024</a:t>
             </a:fld>
             <a:endParaRPr lang="en-US"/>
           </a:p>
@@ -1238,7 +1242,7 @@
           <a:p>
             <a:fld id="{F0D60A6E-7201-4A4D-A930-2F88FE528610}" type="datetimeFigureOut">
               <a:rPr lang="en-US" smtClean="0"/>
-              <a:t>7/9/2024</a:t>
+              <a:t>7/10/2024</a:t>
             </a:fld>
             <a:endParaRPr lang="en-US"/>
           </a:p>
@@ -1449,7 +1453,7 @@
           <a:p>
             <a:fld id="{F0D60A6E-7201-4A4D-A930-2F88FE528610}" type="datetimeFigureOut">
               <a:rPr lang="en-US" smtClean="0"/>
-              <a:t>7/9/2024</a:t>
+              <a:t>7/10/2024</a:t>
             </a:fld>
             <a:endParaRPr lang="en-US"/>
           </a:p>
@@ -1744,7 +1748,7 @@
           <a:p>
             <a:fld id="{F0D60A6E-7201-4A4D-A930-2F88FE528610}" type="datetimeFigureOut">
               <a:rPr lang="en-US" smtClean="0"/>
-              <a:t>7/9/2024</a:t>
+              <a:t>7/10/2024</a:t>
             </a:fld>
             <a:endParaRPr lang="en-US"/>
           </a:p>
@@ -2073,7 +2077,7 @@
           <a:p>
             <a:fld id="{F0D60A6E-7201-4A4D-A930-2F88FE528610}" type="datetimeFigureOut">
               <a:rPr lang="en-US" smtClean="0"/>
-              <a:t>7/9/2024</a:t>
+              <a:t>7/10/2024</a:t>
             </a:fld>
             <a:endParaRPr lang="en-US"/>
           </a:p>
@@ -2565,7 +2569,7 @@
           <a:p>
             <a:fld id="{F0D60A6E-7201-4A4D-A930-2F88FE528610}" type="datetimeFigureOut">
               <a:rPr lang="en-US" smtClean="0"/>
-              <a:t>7/9/2024</a:t>
+              <a:t>7/10/2024</a:t>
             </a:fld>
             <a:endParaRPr lang="en-US"/>
           </a:p>
@@ -2724,7 +2728,7 @@
           <a:p>
             <a:fld id="{F0D60A6E-7201-4A4D-A930-2F88FE528610}" type="datetimeFigureOut">
               <a:rPr lang="en-US" smtClean="0"/>
-              <a:t>7/9/2024</a:t>
+              <a:t>7/10/2024</a:t>
             </a:fld>
             <a:endParaRPr lang="en-US"/>
           </a:p>
@@ -2860,7 +2864,7 @@
           <a:p>
             <a:fld id="{F0D60A6E-7201-4A4D-A930-2F88FE528610}" type="datetimeFigureOut">
               <a:rPr lang="en-US" smtClean="0"/>
-              <a:t>7/9/2024</a:t>
+              <a:t>7/10/2024</a:t>
             </a:fld>
             <a:endParaRPr lang="en-US"/>
           </a:p>
@@ -3188,7 +3192,7 @@
           <a:p>
             <a:fld id="{F0D60A6E-7201-4A4D-A930-2F88FE528610}" type="datetimeFigureOut">
               <a:rPr lang="en-US" smtClean="0"/>
-              <a:t>7/9/2024</a:t>
+              <a:t>7/10/2024</a:t>
             </a:fld>
             <a:endParaRPr lang="en-US"/>
           </a:p>
@@ -3503,7 +3507,7 @@
           <a:p>
             <a:fld id="{F0D60A6E-7201-4A4D-A930-2F88FE528610}" type="datetimeFigureOut">
               <a:rPr lang="en-US" smtClean="0"/>
-              <a:t>7/9/2024</a:t>
+              <a:t>7/10/2024</a:t>
             </a:fld>
             <a:endParaRPr lang="en-US"/>
           </a:p>
@@ -3755,7 +3759,7 @@
           <a:p>
             <a:fld id="{F0D60A6E-7201-4A4D-A930-2F88FE528610}" type="datetimeFigureOut">
               <a:rPr lang="en-US" smtClean="0"/>
-              <a:t>7/9/2024</a:t>
+              <a:t>7/10/2024</a:t>
             </a:fld>
             <a:endParaRPr lang="en-US"/>
           </a:p>
@@ -4545,6 +4549,922 @@
       </p:grpSpPr>
       <p:sp>
         <p:nvSpPr>
+          <p:cNvPr id="3" name="TextBox 2">
+            <a:extLst>
+              <a:ext uri="{FF2B5EF4-FFF2-40B4-BE49-F238E27FC236}">
+                <a16:creationId xmlns:a16="http://schemas.microsoft.com/office/drawing/2014/main" id="{FC154D50-C670-5760-76A3-4026A1CE03F1}"/>
+              </a:ext>
+            </a:extLst>
+          </p:cNvPr>
+          <p:cNvSpPr txBox="1"/>
+          <p:nvPr/>
+        </p:nvSpPr>
+        <p:spPr>
+          <a:xfrm>
+            <a:off x="701674" y="0"/>
+            <a:ext cx="7985125" cy="6686189"/>
+          </a:xfrm>
+          <a:prstGeom prst="rect">
+            <a:avLst/>
+          </a:prstGeom>
+          <a:noFill/>
+        </p:spPr>
+        <p:txBody>
+          <a:bodyPr wrap="square">
+            <a:spAutoFit/>
+          </a:bodyPr>
+          <a:lstStyle/>
+          <a:p>
+            <a:pPr>
+              <a:lnSpc>
+                <a:spcPct val="150000"/>
+              </a:lnSpc>
+            </a:pPr>
+            <a:r>
+              <a:rPr lang="en-US" dirty="0"/>
+              <a:t>CREATE TABLE Customer(</a:t>
+            </a:r>
+          </a:p>
+          <a:p>
+            <a:pPr>
+              <a:lnSpc>
+                <a:spcPct val="150000"/>
+              </a:lnSpc>
+            </a:pPr>
+            <a:r>
+              <a:rPr lang="en-US" dirty="0"/>
+              <a:t>    </a:t>
+            </a:r>
+            <a:r>
+              <a:rPr lang="en-US" dirty="0" err="1"/>
+              <a:t>CustomerID</a:t>
+            </a:r>
+            <a:r>
+              <a:rPr lang="en-US" dirty="0"/>
+              <a:t> INT PRIMARY KEY,</a:t>
+            </a:r>
+          </a:p>
+          <a:p>
+            <a:pPr>
+              <a:lnSpc>
+                <a:spcPct val="150000"/>
+              </a:lnSpc>
+            </a:pPr>
+            <a:r>
+              <a:rPr lang="en-US" dirty="0"/>
+              <a:t>    </a:t>
+            </a:r>
+            <a:r>
+              <a:rPr lang="en-US" dirty="0" err="1"/>
+              <a:t>CustomerName</a:t>
+            </a:r>
+            <a:r>
+              <a:rPr lang="en-US" dirty="0"/>
+              <a:t> VARCHAR(50),</a:t>
+            </a:r>
+          </a:p>
+          <a:p>
+            <a:pPr>
+              <a:lnSpc>
+                <a:spcPct val="150000"/>
+              </a:lnSpc>
+            </a:pPr>
+            <a:r>
+              <a:rPr lang="en-US" dirty="0"/>
+              <a:t>    </a:t>
+            </a:r>
+            <a:r>
+              <a:rPr lang="en-US" dirty="0" err="1"/>
+              <a:t>LastName</a:t>
+            </a:r>
+            <a:r>
+              <a:rPr lang="en-US" dirty="0"/>
+              <a:t> VARCHAR(50),</a:t>
+            </a:r>
+          </a:p>
+          <a:p>
+            <a:pPr>
+              <a:lnSpc>
+                <a:spcPct val="150000"/>
+              </a:lnSpc>
+            </a:pPr>
+            <a:r>
+              <a:rPr lang="en-US" dirty="0"/>
+              <a:t>    Country VARCHAR(50),</a:t>
+            </a:r>
+          </a:p>
+          <a:p>
+            <a:pPr>
+              <a:lnSpc>
+                <a:spcPct val="150000"/>
+              </a:lnSpc>
+            </a:pPr>
+            <a:r>
+              <a:rPr lang="en-US" dirty="0"/>
+              <a:t>    Age int(2),</a:t>
+            </a:r>
+          </a:p>
+          <a:p>
+            <a:pPr>
+              <a:lnSpc>
+                <a:spcPct val="150000"/>
+              </a:lnSpc>
+            </a:pPr>
+            <a:r>
+              <a:rPr lang="en-US" dirty="0"/>
+              <a:t>  Phone int(10)</a:t>
+            </a:r>
+          </a:p>
+          <a:p>
+            <a:pPr>
+              <a:lnSpc>
+                <a:spcPct val="150000"/>
+              </a:lnSpc>
+            </a:pPr>
+            <a:r>
+              <a:rPr lang="en-US" dirty="0"/>
+              <a:t>);</a:t>
+            </a:r>
+          </a:p>
+          <a:p>
+            <a:pPr>
+              <a:lnSpc>
+                <a:spcPct val="150000"/>
+              </a:lnSpc>
+            </a:pPr>
+            <a:r>
+              <a:rPr lang="en-US" dirty="0"/>
+              <a:t>-- Insert some sample data into the Customers table</a:t>
+            </a:r>
+          </a:p>
+          <a:p>
+            <a:pPr>
+              <a:lnSpc>
+                <a:spcPct val="150000"/>
+              </a:lnSpc>
+            </a:pPr>
+            <a:r>
+              <a:rPr lang="en-US" dirty="0"/>
+              <a:t>INSERT INTO Customer (</a:t>
+            </a:r>
+            <a:r>
+              <a:rPr lang="en-US" dirty="0" err="1"/>
+              <a:t>CustomerID</a:t>
+            </a:r>
+            <a:r>
+              <a:rPr lang="en-US" dirty="0"/>
+              <a:t>, </a:t>
+            </a:r>
+            <a:r>
+              <a:rPr lang="en-US" dirty="0" err="1"/>
+              <a:t>CustomerName</a:t>
+            </a:r>
+            <a:r>
+              <a:rPr lang="en-US" dirty="0"/>
+              <a:t>, </a:t>
+            </a:r>
+            <a:r>
+              <a:rPr lang="en-US" dirty="0" err="1"/>
+              <a:t>LastName</a:t>
+            </a:r>
+            <a:r>
+              <a:rPr lang="en-US" dirty="0"/>
+              <a:t>, Country, Age, Phone)</a:t>
+            </a:r>
+          </a:p>
+          <a:p>
+            <a:pPr>
+              <a:lnSpc>
+                <a:spcPct val="150000"/>
+              </a:lnSpc>
+            </a:pPr>
+            <a:r>
+              <a:rPr lang="en-US" dirty="0"/>
+              <a:t>VALUES (1, 'Shubham', 'Thakur', 'India','23','xxxxxxxxxx'),</a:t>
+            </a:r>
+          </a:p>
+          <a:p>
+            <a:pPr>
+              <a:lnSpc>
+                <a:spcPct val="150000"/>
+              </a:lnSpc>
+            </a:pPr>
+            <a:r>
+              <a:rPr lang="en-US" dirty="0"/>
+              <a:t>       (2, 'Aman ', 'Chopra', 'Australia','21','xxxxxxxxxx'),</a:t>
+            </a:r>
+          </a:p>
+          <a:p>
+            <a:pPr>
+              <a:lnSpc>
+                <a:spcPct val="150000"/>
+              </a:lnSpc>
+            </a:pPr>
+            <a:r>
+              <a:rPr lang="en-US" dirty="0"/>
+              <a:t>       (3, 'Naveen', 'Tulasi', 'Sri lanka','24','xxxxxxxxxx'),</a:t>
+            </a:r>
+          </a:p>
+          <a:p>
+            <a:pPr>
+              <a:lnSpc>
+                <a:spcPct val="150000"/>
+              </a:lnSpc>
+            </a:pPr>
+            <a:r>
+              <a:rPr lang="en-US" dirty="0"/>
+              <a:t>       (4, 'Aditya', 'Arpan', 'Austria','21','xxxxxxxxxx'),</a:t>
+            </a:r>
+          </a:p>
+          <a:p>
+            <a:pPr>
+              <a:lnSpc>
+                <a:spcPct val="150000"/>
+              </a:lnSpc>
+            </a:pPr>
+            <a:r>
+              <a:rPr lang="en-US" dirty="0"/>
+              <a:t>       (5, 'Nishant. </a:t>
+            </a:r>
+            <a:r>
+              <a:rPr lang="en-US" dirty="0" err="1"/>
+              <a:t>Salchichas</a:t>
+            </a:r>
+            <a:r>
+              <a:rPr lang="en-US" dirty="0"/>
+              <a:t> S.A.', 'Jain', 'Spain','22','xxxxxxxxxx');</a:t>
+            </a:r>
+          </a:p>
+        </p:txBody>
+      </p:sp>
+    </p:spTree>
+    <p:extLst>
+      <p:ext uri="{BB962C8B-B14F-4D97-AF65-F5344CB8AC3E}">
+        <p14:creationId xmlns:p14="http://schemas.microsoft.com/office/powerpoint/2010/main" val="3506865775"/>
+      </p:ext>
+    </p:extLst>
+  </p:cSld>
+  <p:clrMapOvr>
+    <a:masterClrMapping/>
+  </p:clrMapOvr>
+</p:sld>
+</file>
+
+<file path=ppt/slides/slide12.xml><?xml version="1.0" encoding="utf-8"?>
+<p:sld xmlns:a="http://schemas.openxmlformats.org/drawingml/2006/main" xmlns:r="http://schemas.openxmlformats.org/officeDocument/2006/relationships" xmlns:p="http://schemas.openxmlformats.org/presentationml/2006/main">
+  <p:cSld>
+    <p:spTree>
+      <p:nvGrpSpPr>
+        <p:cNvPr id="1" name=""/>
+        <p:cNvGrpSpPr/>
+        <p:nvPr/>
+      </p:nvGrpSpPr>
+      <p:grpSpPr>
+        <a:xfrm>
+          <a:off x="0" y="0"/>
+          <a:ext cx="0" cy="0"/>
+          <a:chOff x="0" y="0"/>
+          <a:chExt cx="0" cy="0"/>
+        </a:xfrm>
+      </p:grpSpPr>
+      <p:sp>
+        <p:nvSpPr>
+          <p:cNvPr id="6" name="TextBox 5">
+            <a:extLst>
+              <a:ext uri="{FF2B5EF4-FFF2-40B4-BE49-F238E27FC236}">
+                <a16:creationId xmlns:a16="http://schemas.microsoft.com/office/drawing/2014/main" id="{F2A2A462-B7FB-2141-F2C8-1428EC42401D}"/>
+              </a:ext>
+            </a:extLst>
+          </p:cNvPr>
+          <p:cNvSpPr txBox="1"/>
+          <p:nvPr/>
+        </p:nvSpPr>
+        <p:spPr>
+          <a:xfrm>
+            <a:off x="7004050" y="735737"/>
+            <a:ext cx="4375150" cy="3881575"/>
+          </a:xfrm>
+          <a:prstGeom prst="rect">
+            <a:avLst/>
+          </a:prstGeom>
+          <a:noFill/>
+        </p:spPr>
+        <p:txBody>
+          <a:bodyPr wrap="square">
+            <a:spAutoFit/>
+          </a:bodyPr>
+          <a:lstStyle/>
+          <a:p>
+            <a:pPr>
+              <a:lnSpc>
+                <a:spcPct val="200000"/>
+              </a:lnSpc>
+            </a:pPr>
+            <a:r>
+              <a:rPr lang="en-US" dirty="0"/>
+              <a:t>SELECT </a:t>
+            </a:r>
+            <a:r>
+              <a:rPr lang="en-US" dirty="0" err="1"/>
+              <a:t>CustomerName</a:t>
+            </a:r>
+            <a:r>
+              <a:rPr lang="en-US" dirty="0"/>
+              <a:t>, Age,</a:t>
+            </a:r>
+          </a:p>
+          <a:p>
+            <a:pPr>
+              <a:lnSpc>
+                <a:spcPct val="200000"/>
+              </a:lnSpc>
+            </a:pPr>
+            <a:r>
+              <a:rPr lang="en-US" dirty="0"/>
+              <a:t>CASE</a:t>
+            </a:r>
+          </a:p>
+          <a:p>
+            <a:pPr>
+              <a:lnSpc>
+                <a:spcPct val="200000"/>
+              </a:lnSpc>
+            </a:pPr>
+            <a:r>
+              <a:rPr lang="en-US" dirty="0"/>
+              <a:t>    WHEN Country = "India" THEN 'Indian'</a:t>
+            </a:r>
+          </a:p>
+          <a:p>
+            <a:pPr>
+              <a:lnSpc>
+                <a:spcPct val="200000"/>
+              </a:lnSpc>
+            </a:pPr>
+            <a:r>
+              <a:rPr lang="en-US" dirty="0"/>
+              <a:t>    ELSE 'Foreign'</a:t>
+            </a:r>
+          </a:p>
+          <a:p>
+            <a:pPr>
+              <a:lnSpc>
+                <a:spcPct val="200000"/>
+              </a:lnSpc>
+            </a:pPr>
+            <a:r>
+              <a:rPr lang="en-US" dirty="0"/>
+              <a:t>END AS Nationality</a:t>
+            </a:r>
+          </a:p>
+          <a:p>
+            <a:pPr>
+              <a:lnSpc>
+                <a:spcPct val="200000"/>
+              </a:lnSpc>
+            </a:pPr>
+            <a:r>
+              <a:rPr lang="en-US" dirty="0"/>
+              <a:t>FROM Customer;</a:t>
+            </a:r>
+          </a:p>
+        </p:txBody>
+      </p:sp>
+      <p:sp>
+        <p:nvSpPr>
+          <p:cNvPr id="9" name="TextBox 8">
+            <a:extLst>
+              <a:ext uri="{FF2B5EF4-FFF2-40B4-BE49-F238E27FC236}">
+                <a16:creationId xmlns:a16="http://schemas.microsoft.com/office/drawing/2014/main" id="{4A08A3FA-FA81-60BA-4277-D362EE727CA5}"/>
+              </a:ext>
+            </a:extLst>
+          </p:cNvPr>
+          <p:cNvSpPr txBox="1"/>
+          <p:nvPr/>
+        </p:nvSpPr>
+        <p:spPr>
+          <a:xfrm>
+            <a:off x="508000" y="825313"/>
+            <a:ext cx="6102350" cy="3881575"/>
+          </a:xfrm>
+          <a:prstGeom prst="rect">
+            <a:avLst/>
+          </a:prstGeom>
+          <a:noFill/>
+        </p:spPr>
+        <p:txBody>
+          <a:bodyPr wrap="square">
+            <a:spAutoFit/>
+          </a:bodyPr>
+          <a:lstStyle/>
+          <a:p>
+            <a:pPr>
+              <a:lnSpc>
+                <a:spcPct val="200000"/>
+              </a:lnSpc>
+            </a:pPr>
+            <a:r>
+              <a:rPr lang="en-US" dirty="0"/>
+              <a:t>SELECT </a:t>
+            </a:r>
+            <a:r>
+              <a:rPr lang="en-US" dirty="0" err="1"/>
+              <a:t>CustomerName</a:t>
+            </a:r>
+            <a:r>
+              <a:rPr lang="en-US" dirty="0"/>
+              <a:t>, Age,</a:t>
+            </a:r>
+          </a:p>
+          <a:p>
+            <a:pPr>
+              <a:lnSpc>
+                <a:spcPct val="200000"/>
+              </a:lnSpc>
+            </a:pPr>
+            <a:r>
+              <a:rPr lang="en-US" dirty="0"/>
+              <a:t>CASE</a:t>
+            </a:r>
+          </a:p>
+          <a:p>
+            <a:pPr>
+              <a:lnSpc>
+                <a:spcPct val="200000"/>
+              </a:lnSpc>
+            </a:pPr>
+            <a:r>
+              <a:rPr lang="en-US" dirty="0"/>
+              <a:t>    WHEN Age&gt; 22 THEN 'The Age is greater than 22'</a:t>
+            </a:r>
+          </a:p>
+          <a:p>
+            <a:pPr>
+              <a:lnSpc>
+                <a:spcPct val="200000"/>
+              </a:lnSpc>
+            </a:pPr>
+            <a:r>
+              <a:rPr lang="en-US" dirty="0"/>
+              <a:t>    WHEN Age = 21 THEN 'The Age is 21'</a:t>
+            </a:r>
+          </a:p>
+          <a:p>
+            <a:pPr>
+              <a:lnSpc>
+                <a:spcPct val="200000"/>
+              </a:lnSpc>
+            </a:pPr>
+            <a:r>
+              <a:rPr lang="en-US" dirty="0"/>
+              <a:t>    ELSE 'The Age is over 30'</a:t>
+            </a:r>
+          </a:p>
+          <a:p>
+            <a:pPr>
+              <a:lnSpc>
+                <a:spcPct val="200000"/>
+              </a:lnSpc>
+            </a:pPr>
+            <a:r>
+              <a:rPr lang="en-US" dirty="0"/>
+              <a:t>END AS </a:t>
+            </a:r>
+            <a:r>
+              <a:rPr lang="en-US" dirty="0" err="1"/>
+              <a:t>QuantityText</a:t>
+            </a:r>
+            <a:endParaRPr lang="en-US" dirty="0"/>
+          </a:p>
+          <a:p>
+            <a:pPr>
+              <a:lnSpc>
+                <a:spcPct val="200000"/>
+              </a:lnSpc>
+            </a:pPr>
+            <a:r>
+              <a:rPr lang="en-US" dirty="0"/>
+              <a:t>FROM Customer;</a:t>
+            </a:r>
+          </a:p>
+        </p:txBody>
+      </p:sp>
+    </p:spTree>
+    <p:extLst>
+      <p:ext uri="{BB962C8B-B14F-4D97-AF65-F5344CB8AC3E}">
+        <p14:creationId xmlns:p14="http://schemas.microsoft.com/office/powerpoint/2010/main" val="4171044977"/>
+      </p:ext>
+    </p:extLst>
+  </p:cSld>
+  <p:clrMapOvr>
+    <a:masterClrMapping/>
+  </p:clrMapOvr>
+</p:sld>
+</file>
+
+<file path=ppt/slides/slide13.xml><?xml version="1.0" encoding="utf-8"?>
+<p:sld xmlns:a="http://schemas.openxmlformats.org/drawingml/2006/main" xmlns:r="http://schemas.openxmlformats.org/officeDocument/2006/relationships" xmlns:p="http://schemas.openxmlformats.org/presentationml/2006/main">
+  <p:cSld>
+    <p:spTree>
+      <p:nvGrpSpPr>
+        <p:cNvPr id="1" name=""/>
+        <p:cNvGrpSpPr/>
+        <p:nvPr/>
+      </p:nvGrpSpPr>
+      <p:grpSpPr>
+        <a:xfrm>
+          <a:off x="0" y="0"/>
+          <a:ext cx="0" cy="0"/>
+          <a:chOff x="0" y="0"/>
+          <a:chExt cx="0" cy="0"/>
+        </a:xfrm>
+      </p:grpSpPr>
+      <p:sp>
+        <p:nvSpPr>
+          <p:cNvPr id="4" name="TextBox 3">
+            <a:extLst>
+              <a:ext uri="{FF2B5EF4-FFF2-40B4-BE49-F238E27FC236}">
+                <a16:creationId xmlns:a16="http://schemas.microsoft.com/office/drawing/2014/main" id="{C26A2744-1E9F-5873-2938-2B3C40D82503}"/>
+              </a:ext>
+            </a:extLst>
+          </p:cNvPr>
+          <p:cNvSpPr txBox="1"/>
+          <p:nvPr/>
+        </p:nvSpPr>
+        <p:spPr>
+          <a:xfrm>
+            <a:off x="3044825" y="1219538"/>
+            <a:ext cx="6102350" cy="3881575"/>
+          </a:xfrm>
+          <a:prstGeom prst="rect">
+            <a:avLst/>
+          </a:prstGeom>
+          <a:noFill/>
+        </p:spPr>
+        <p:txBody>
+          <a:bodyPr wrap="square">
+            <a:spAutoFit/>
+          </a:bodyPr>
+          <a:lstStyle/>
+          <a:p>
+            <a:pPr>
+              <a:lnSpc>
+                <a:spcPct val="200000"/>
+              </a:lnSpc>
+            </a:pPr>
+            <a:r>
+              <a:rPr lang="en-US" dirty="0"/>
+              <a:t>SELECT </a:t>
+            </a:r>
+            <a:r>
+              <a:rPr lang="en-US" dirty="0" err="1"/>
+              <a:t>CustomerName</a:t>
+            </a:r>
+            <a:r>
+              <a:rPr lang="en-US" dirty="0"/>
+              <a:t>, Country</a:t>
+            </a:r>
+          </a:p>
+          <a:p>
+            <a:pPr>
+              <a:lnSpc>
+                <a:spcPct val="200000"/>
+              </a:lnSpc>
+            </a:pPr>
+            <a:r>
+              <a:rPr lang="en-US" dirty="0"/>
+              <a:t>FROM Customer</a:t>
+            </a:r>
+          </a:p>
+          <a:p>
+            <a:pPr>
+              <a:lnSpc>
+                <a:spcPct val="200000"/>
+              </a:lnSpc>
+            </a:pPr>
+            <a:r>
+              <a:rPr lang="en-US" dirty="0"/>
+              <a:t>ORDER BY</a:t>
+            </a:r>
+          </a:p>
+          <a:p>
+            <a:pPr>
+              <a:lnSpc>
+                <a:spcPct val="200000"/>
+              </a:lnSpc>
+            </a:pPr>
+            <a:r>
+              <a:rPr lang="en-US" dirty="0"/>
+              <a:t>(CASE</a:t>
+            </a:r>
+          </a:p>
+          <a:p>
+            <a:pPr>
+              <a:lnSpc>
+                <a:spcPct val="200000"/>
+              </a:lnSpc>
+            </a:pPr>
+            <a:r>
+              <a:rPr lang="en-US" dirty="0"/>
+              <a:t>    WHEN Country  IS 'India' THEN Country</a:t>
+            </a:r>
+          </a:p>
+          <a:p>
+            <a:pPr>
+              <a:lnSpc>
+                <a:spcPct val="200000"/>
+              </a:lnSpc>
+            </a:pPr>
+            <a:r>
+              <a:rPr lang="en-US" dirty="0"/>
+              <a:t>    ELSE Age</a:t>
+            </a:r>
+          </a:p>
+          <a:p>
+            <a:pPr>
+              <a:lnSpc>
+                <a:spcPct val="200000"/>
+              </a:lnSpc>
+            </a:pPr>
+            <a:r>
+              <a:rPr lang="en-US" dirty="0"/>
+              <a:t>END);</a:t>
+            </a:r>
+          </a:p>
+        </p:txBody>
+      </p:sp>
+    </p:spTree>
+    <p:extLst>
+      <p:ext uri="{BB962C8B-B14F-4D97-AF65-F5344CB8AC3E}">
+        <p14:creationId xmlns:p14="http://schemas.microsoft.com/office/powerpoint/2010/main" val="2310950146"/>
+      </p:ext>
+    </p:extLst>
+  </p:cSld>
+  <p:clrMapOvr>
+    <a:masterClrMapping/>
+  </p:clrMapOvr>
+</p:sld>
+</file>
+
+<file path=ppt/slides/slide14.xml><?xml version="1.0" encoding="utf-8"?>
+<p:sld xmlns:a="http://schemas.openxmlformats.org/drawingml/2006/main" xmlns:r="http://schemas.openxmlformats.org/officeDocument/2006/relationships" xmlns:p="http://schemas.openxmlformats.org/presentationml/2006/main">
+  <p:cSld>
+    <p:spTree>
+      <p:nvGrpSpPr>
+        <p:cNvPr id="1" name=""/>
+        <p:cNvGrpSpPr/>
+        <p:nvPr/>
+      </p:nvGrpSpPr>
+      <p:grpSpPr>
+        <a:xfrm>
+          <a:off x="0" y="0"/>
+          <a:ext cx="0" cy="0"/>
+          <a:chOff x="0" y="0"/>
+          <a:chExt cx="0" cy="0"/>
+        </a:xfrm>
+      </p:grpSpPr>
+      <p:sp>
+        <p:nvSpPr>
+          <p:cNvPr id="4" name="TextBox 3">
+            <a:extLst>
+              <a:ext uri="{FF2B5EF4-FFF2-40B4-BE49-F238E27FC236}">
+                <a16:creationId xmlns:a16="http://schemas.microsoft.com/office/drawing/2014/main" id="{29D13672-E818-02ED-E66D-8F99F5E007B7}"/>
+              </a:ext>
+            </a:extLst>
+          </p:cNvPr>
+          <p:cNvSpPr txBox="1"/>
+          <p:nvPr/>
+        </p:nvSpPr>
+        <p:spPr>
+          <a:xfrm>
+            <a:off x="803275" y="1431061"/>
+            <a:ext cx="6102350" cy="2773580"/>
+          </a:xfrm>
+          <a:prstGeom prst="rect">
+            <a:avLst/>
+          </a:prstGeom>
+          <a:noFill/>
+        </p:spPr>
+        <p:txBody>
+          <a:bodyPr wrap="square">
+            <a:spAutoFit/>
+          </a:bodyPr>
+          <a:lstStyle/>
+          <a:p>
+            <a:pPr>
+              <a:lnSpc>
+                <a:spcPct val="200000"/>
+              </a:lnSpc>
+            </a:pPr>
+            <a:r>
+              <a:rPr lang="en-US" dirty="0"/>
+              <a:t>SELECT </a:t>
+            </a:r>
+            <a:r>
+              <a:rPr lang="en-US" dirty="0" err="1"/>
+              <a:t>customer_id</a:t>
+            </a:r>
+            <a:r>
+              <a:rPr lang="en-US" dirty="0"/>
+              <a:t>, </a:t>
+            </a:r>
+            <a:r>
+              <a:rPr lang="en-US" dirty="0" err="1"/>
+              <a:t>first_name</a:t>
+            </a:r>
+            <a:r>
+              <a:rPr lang="en-US" dirty="0"/>
+              <a:t>,</a:t>
+            </a:r>
+          </a:p>
+          <a:p>
+            <a:pPr>
+              <a:lnSpc>
+                <a:spcPct val="200000"/>
+              </a:lnSpc>
+            </a:pPr>
+            <a:r>
+              <a:rPr lang="en-US" dirty="0"/>
+              <a:t>CASE</a:t>
+            </a:r>
+          </a:p>
+          <a:p>
+            <a:pPr>
+              <a:lnSpc>
+                <a:spcPct val="200000"/>
+              </a:lnSpc>
+            </a:pPr>
+            <a:r>
+              <a:rPr lang="en-US" dirty="0"/>
+              <a:t>  WHEN age &gt;= 18 THEN 'Allowed'</a:t>
+            </a:r>
+          </a:p>
+          <a:p>
+            <a:pPr>
+              <a:lnSpc>
+                <a:spcPct val="200000"/>
+              </a:lnSpc>
+            </a:pPr>
+            <a:r>
+              <a:rPr lang="en-US" dirty="0"/>
+              <a:t>END AS </a:t>
+            </a:r>
+            <a:r>
+              <a:rPr lang="en-US" dirty="0" err="1"/>
+              <a:t>can_vote</a:t>
+            </a:r>
+            <a:endParaRPr lang="en-US" dirty="0"/>
+          </a:p>
+          <a:p>
+            <a:pPr>
+              <a:lnSpc>
+                <a:spcPct val="200000"/>
+              </a:lnSpc>
+            </a:pPr>
+            <a:r>
+              <a:rPr lang="en-US" dirty="0"/>
+              <a:t>FROM Customers;</a:t>
+            </a:r>
+          </a:p>
+        </p:txBody>
+      </p:sp>
+      <p:sp>
+        <p:nvSpPr>
+          <p:cNvPr id="7" name="TextBox 6">
+            <a:extLst>
+              <a:ext uri="{FF2B5EF4-FFF2-40B4-BE49-F238E27FC236}">
+                <a16:creationId xmlns:a16="http://schemas.microsoft.com/office/drawing/2014/main" id="{2069D8B3-4102-5643-8473-ED140B4AA22E}"/>
+              </a:ext>
+            </a:extLst>
+          </p:cNvPr>
+          <p:cNvSpPr txBox="1"/>
+          <p:nvPr/>
+        </p:nvSpPr>
+        <p:spPr>
+          <a:xfrm>
+            <a:off x="5603875" y="1154062"/>
+            <a:ext cx="6102350" cy="3327578"/>
+          </a:xfrm>
+          <a:prstGeom prst="rect">
+            <a:avLst/>
+          </a:prstGeom>
+          <a:noFill/>
+        </p:spPr>
+        <p:txBody>
+          <a:bodyPr wrap="square">
+            <a:spAutoFit/>
+          </a:bodyPr>
+          <a:lstStyle/>
+          <a:p>
+            <a:pPr>
+              <a:lnSpc>
+                <a:spcPct val="200000"/>
+              </a:lnSpc>
+            </a:pPr>
+            <a:r>
+              <a:rPr lang="en-US" dirty="0"/>
+              <a:t>SELECT </a:t>
+            </a:r>
+            <a:r>
+              <a:rPr lang="en-US" dirty="0" err="1"/>
+              <a:t>order_id</a:t>
+            </a:r>
+            <a:r>
+              <a:rPr lang="en-US" dirty="0"/>
+              <a:t>, </a:t>
+            </a:r>
+            <a:r>
+              <a:rPr lang="en-US" dirty="0" err="1"/>
+              <a:t>customer_id</a:t>
+            </a:r>
+            <a:r>
+              <a:rPr lang="en-US" dirty="0"/>
+              <a:t>,</a:t>
+            </a:r>
+          </a:p>
+          <a:p>
+            <a:pPr>
+              <a:lnSpc>
+                <a:spcPct val="200000"/>
+              </a:lnSpc>
+            </a:pPr>
+            <a:r>
+              <a:rPr lang="en-US" dirty="0"/>
+              <a:t>CASE</a:t>
+            </a:r>
+          </a:p>
+          <a:p>
+            <a:pPr>
+              <a:lnSpc>
+                <a:spcPct val="200000"/>
+              </a:lnSpc>
+            </a:pPr>
+            <a:r>
+              <a:rPr lang="en-US" dirty="0"/>
+              <a:t>    WHEN amount &gt;= 400 THEN (amount - amount * 10/100)</a:t>
+            </a:r>
+          </a:p>
+          <a:p>
+            <a:pPr>
+              <a:lnSpc>
+                <a:spcPct val="200000"/>
+              </a:lnSpc>
+            </a:pPr>
+            <a:r>
+              <a:rPr lang="en-US" dirty="0"/>
+              <a:t>END AS </a:t>
+            </a:r>
+            <a:r>
+              <a:rPr lang="en-US" dirty="0" err="1"/>
+              <a:t>offer_price</a:t>
+            </a:r>
+            <a:endParaRPr lang="en-US" dirty="0"/>
+          </a:p>
+          <a:p>
+            <a:pPr>
+              <a:lnSpc>
+                <a:spcPct val="200000"/>
+              </a:lnSpc>
+            </a:pPr>
+            <a:r>
+              <a:rPr lang="en-US" dirty="0"/>
+              <a:t>FROM Orders;</a:t>
+            </a:r>
+          </a:p>
+        </p:txBody>
+      </p:sp>
+    </p:spTree>
+    <p:extLst>
+      <p:ext uri="{BB962C8B-B14F-4D97-AF65-F5344CB8AC3E}">
+        <p14:creationId xmlns:p14="http://schemas.microsoft.com/office/powerpoint/2010/main" val="2522318469"/>
+      </p:ext>
+    </p:extLst>
+  </p:cSld>
+  <p:clrMapOvr>
+    <a:masterClrMapping/>
+  </p:clrMapOvr>
+</p:sld>
+</file>
+
+<file path=ppt/slides/slide15.xml><?xml version="1.0" encoding="utf-8"?>
+<p:sld xmlns:a="http://schemas.openxmlformats.org/drawingml/2006/main" xmlns:r="http://schemas.openxmlformats.org/officeDocument/2006/relationships" xmlns:p="http://schemas.openxmlformats.org/presentationml/2006/main">
+  <p:cSld>
+    <p:spTree>
+      <p:nvGrpSpPr>
+        <p:cNvPr id="1" name=""/>
+        <p:cNvGrpSpPr/>
+        <p:nvPr/>
+      </p:nvGrpSpPr>
+      <p:grpSpPr>
+        <a:xfrm>
+          <a:off x="0" y="0"/>
+          <a:ext cx="0" cy="0"/>
+          <a:chOff x="0" y="0"/>
+          <a:chExt cx="0" cy="0"/>
+        </a:xfrm>
+      </p:grpSpPr>
+      <p:sp>
+        <p:nvSpPr>
           <p:cNvPr id="5" name="TextBox 4">
             <a:extLst>
               <a:ext uri="{FF2B5EF4-FFF2-40B4-BE49-F238E27FC236}">
@@ -4684,7 +5604,7 @@
 </p:sld>
 </file>
 
-<file path=ppt/slides/slide12.xml><?xml version="1.0" encoding="utf-8"?>
+<file path=ppt/slides/slide16.xml><?xml version="1.0" encoding="utf-8"?>
 <p:sld xmlns:a="http://schemas.openxmlformats.org/drawingml/2006/main" xmlns:r="http://schemas.openxmlformats.org/officeDocument/2006/relationships" xmlns:p="http://schemas.openxmlformats.org/presentationml/2006/main">
   <p:cSld>
     <p:spTree>
@@ -4842,7 +5762,7 @@
 </p:sld>
 </file>
 
-<file path=ppt/slides/slide13.xml><?xml version="1.0" encoding="utf-8"?>
+<file path=ppt/slides/slide17.xml><?xml version="1.0" encoding="utf-8"?>
 <p:sld xmlns:a="http://schemas.openxmlformats.org/drawingml/2006/main" xmlns:r="http://schemas.openxmlformats.org/officeDocument/2006/relationships" xmlns:p="http://schemas.openxmlformats.org/presentationml/2006/main">
   <p:cSld>
     <p:spTree>
@@ -5000,7 +5920,7 @@
 </p:sld>
 </file>
 
-<file path=ppt/slides/slide14.xml><?xml version="1.0" encoding="utf-8"?>
+<file path=ppt/slides/slide18.xml><?xml version="1.0" encoding="utf-8"?>
 <p:sld xmlns:a="http://schemas.openxmlformats.org/drawingml/2006/main" xmlns:r="http://schemas.openxmlformats.org/officeDocument/2006/relationships" xmlns:p="http://schemas.openxmlformats.org/presentationml/2006/main">
   <p:cSld>
     <p:spTree>
@@ -5158,7 +6078,7 @@
 </p:sld>
 </file>
 
-<file path=ppt/slides/slide15.xml><?xml version="1.0" encoding="utf-8"?>
+<file path=ppt/slides/slide19.xml><?xml version="1.0" encoding="utf-8"?>
 <p:sld xmlns:a="http://schemas.openxmlformats.org/drawingml/2006/main" xmlns:r="http://schemas.openxmlformats.org/officeDocument/2006/relationships" xmlns:p="http://schemas.openxmlformats.org/presentationml/2006/main">
   <p:cSld>
     <p:spTree>
@@ -5316,7 +6236,295 @@
 </p:sld>
 </file>
 
-<file path=ppt/slides/slide16.xml><?xml version="1.0" encoding="utf-8"?>
+<file path=ppt/slides/slide2.xml><?xml version="1.0" encoding="utf-8"?>
+<p:sld xmlns:a="http://schemas.openxmlformats.org/drawingml/2006/main" xmlns:r="http://schemas.openxmlformats.org/officeDocument/2006/relationships" xmlns:p="http://schemas.openxmlformats.org/presentationml/2006/main">
+  <p:cSld>
+    <p:spTree>
+      <p:nvGrpSpPr>
+        <p:cNvPr id="1" name=""/>
+        <p:cNvGrpSpPr/>
+        <p:nvPr/>
+      </p:nvGrpSpPr>
+      <p:grpSpPr>
+        <a:xfrm>
+          <a:off x="0" y="0"/>
+          <a:ext cx="0" cy="0"/>
+          <a:chOff x="0" y="0"/>
+          <a:chExt cx="0" cy="0"/>
+        </a:xfrm>
+      </p:grpSpPr>
+      <p:sp>
+        <p:nvSpPr>
+          <p:cNvPr id="5" name="TextBox 4">
+            <a:extLst>
+              <a:ext uri="{FF2B5EF4-FFF2-40B4-BE49-F238E27FC236}">
+                <a16:creationId xmlns:a16="http://schemas.microsoft.com/office/drawing/2014/main" id="{44085D18-8669-A35D-D918-DDFE81A3579D}"/>
+              </a:ext>
+            </a:extLst>
+          </p:cNvPr>
+          <p:cNvSpPr txBox="1"/>
+          <p:nvPr/>
+        </p:nvSpPr>
+        <p:spPr>
+          <a:xfrm>
+            <a:off x="2133600" y="0"/>
+            <a:ext cx="7962899" cy="830997"/>
+          </a:xfrm>
+          <a:prstGeom prst="rect">
+            <a:avLst/>
+          </a:prstGeom>
+          <a:noFill/>
+        </p:spPr>
+        <p:txBody>
+          <a:bodyPr wrap="square">
+            <a:spAutoFit/>
+          </a:bodyPr>
+          <a:lstStyle/>
+          <a:p>
+            <a:pPr algn="ctr"/>
+            <a:r>
+              <a:rPr lang="en-US" sz="4800" b="1" i="0" dirty="0">
+                <a:ln w="22225">
+                  <a:solidFill>
+                    <a:schemeClr val="accent2"/>
+                  </a:solidFill>
+                  <a:prstDash val="solid"/>
+                </a:ln>
+                <a:solidFill>
+                  <a:schemeClr val="accent2">
+                    <a:lumMod val="40000"/>
+                    <a:lumOff val="60000"/>
+                  </a:schemeClr>
+                </a:solidFill>
+                <a:highlight>
+                  <a:srgbClr val="FFFFFF"/>
+                </a:highlight>
+                <a:latin typeface="Wotfard"/>
+              </a:rPr>
+              <a:t>What is Function  SQL Server</a:t>
+            </a:r>
+          </a:p>
+        </p:txBody>
+      </p:sp>
+      <p:sp>
+        <p:nvSpPr>
+          <p:cNvPr id="8" name="TextBox 7">
+            <a:extLst>
+              <a:ext uri="{FF2B5EF4-FFF2-40B4-BE49-F238E27FC236}">
+                <a16:creationId xmlns:a16="http://schemas.microsoft.com/office/drawing/2014/main" id="{D617FF5A-41E7-FA17-3FE0-BCB4F89C5357}"/>
+              </a:ext>
+            </a:extLst>
+          </p:cNvPr>
+          <p:cNvSpPr txBox="1"/>
+          <p:nvPr/>
+        </p:nvSpPr>
+        <p:spPr>
+          <a:xfrm>
+            <a:off x="927100" y="830997"/>
+            <a:ext cx="10083800" cy="2529282"/>
+          </a:xfrm>
+          <a:prstGeom prst="rect">
+            <a:avLst/>
+          </a:prstGeom>
+        </p:spPr>
+        <p:style>
+          <a:lnRef idx="2">
+            <a:schemeClr val="accent2"/>
+          </a:lnRef>
+          <a:fillRef idx="1">
+            <a:schemeClr val="lt1"/>
+          </a:fillRef>
+          <a:effectRef idx="0">
+            <a:schemeClr val="accent2"/>
+          </a:effectRef>
+          <a:fontRef idx="minor">
+            <a:schemeClr val="dk1"/>
+          </a:fontRef>
+        </p:style>
+        <p:txBody>
+          <a:bodyPr wrap="square" numCol="1">
+            <a:spAutoFit/>
+          </a:bodyPr>
+          <a:lstStyle/>
+          <a:p>
+            <a:pPr algn="just">
+              <a:lnSpc>
+                <a:spcPct val="150000"/>
+              </a:lnSpc>
+            </a:pPr>
+            <a:r>
+              <a:rPr lang="en-US" b="0" i="0" dirty="0">
+                <a:solidFill>
+                  <a:srgbClr val="181717"/>
+                </a:solidFill>
+                <a:effectLst/>
+                <a:highlight>
+                  <a:srgbClr val="FFFFFF"/>
+                </a:highlight>
+                <a:latin typeface="Verdana" panose="020B0604030504040204" pitchFamily="34" charset="0"/>
+              </a:rPr>
+              <a:t>Functions in SQL Server are similar to functions in other programming languages. Functions in SQL Server contains SQL statements that perform some specific tasks. Functions can have input parameters and must return a single value or multiple records.</a:t>
+            </a:r>
+          </a:p>
+          <a:p>
+            <a:pPr algn="just">
+              <a:lnSpc>
+                <a:spcPct val="150000"/>
+              </a:lnSpc>
+            </a:pPr>
+            <a:r>
+              <a:rPr lang="en-US" b="0" i="0" dirty="0">
+                <a:solidFill>
+                  <a:srgbClr val="181717"/>
+                </a:solidFill>
+                <a:effectLst/>
+                <a:highlight>
+                  <a:srgbClr val="FFFFFF"/>
+                </a:highlight>
+                <a:latin typeface="Verdana" panose="020B0604030504040204" pitchFamily="34" charset="0"/>
+              </a:rPr>
+              <a:t>If your scripts use the same set of SQL statements repeatedly then this can be converted into a function in the database.</a:t>
+            </a:r>
+          </a:p>
+        </p:txBody>
+      </p:sp>
+      <p:sp>
+        <p:nvSpPr>
+          <p:cNvPr id="9" name="AutoShape 2" descr="sqlserver-page">
+            <a:extLst>
+              <a:ext uri="{FF2B5EF4-FFF2-40B4-BE49-F238E27FC236}">
+                <a16:creationId xmlns:a16="http://schemas.microsoft.com/office/drawing/2014/main" id="{391C2F74-10A7-C19E-24EE-7E95D18FFE1C}"/>
+              </a:ext>
+            </a:extLst>
+          </p:cNvPr>
+          <p:cNvSpPr>
+            <a:spLocks noChangeAspect="1" noChangeArrowheads="1"/>
+          </p:cNvSpPr>
+          <p:nvPr/>
+        </p:nvSpPr>
+        <p:spPr bwMode="auto">
+          <a:xfrm>
+            <a:off x="5943600" y="3276600"/>
+            <a:ext cx="304800" cy="304800"/>
+          </a:xfrm>
+          <a:prstGeom prst="rect">
+            <a:avLst/>
+          </a:prstGeom>
+          <a:noFill/>
+          <a:extLst>
+            <a:ext uri="{909E8E84-426E-40DD-AFC4-6F175D3DCCD1}">
+              <a14:hiddenFill xmlns:a14="http://schemas.microsoft.com/office/drawing/2010/main">
+                <a:solidFill>
+                  <a:srgbClr val="FFFFFF"/>
+                </a:solidFill>
+              </a14:hiddenFill>
+            </a:ext>
+          </a:extLst>
+        </p:spPr>
+        <p:txBody>
+          <a:bodyPr vert="horz" wrap="square" lIns="91440" tIns="45720" rIns="91440" bIns="45720" numCol="1" anchor="t" anchorCtr="0" compatLnSpc="1">
+            <a:prstTxWarp prst="textNoShape">
+              <a:avLst/>
+            </a:prstTxWarp>
+          </a:bodyPr>
+          <a:lstStyle/>
+          <a:p>
+            <a:endParaRPr lang="en-US"/>
+          </a:p>
+        </p:txBody>
+      </p:sp>
+      <p:sp>
+        <p:nvSpPr>
+          <p:cNvPr id="3" name="TextBox 2">
+            <a:extLst>
+              <a:ext uri="{FF2B5EF4-FFF2-40B4-BE49-F238E27FC236}">
+                <a16:creationId xmlns:a16="http://schemas.microsoft.com/office/drawing/2014/main" id="{367C1893-77CD-4792-4C75-3575F1DC4B7E}"/>
+              </a:ext>
+            </a:extLst>
+          </p:cNvPr>
+          <p:cNvSpPr txBox="1"/>
+          <p:nvPr/>
+        </p:nvSpPr>
+        <p:spPr>
+          <a:xfrm>
+            <a:off x="927100" y="3581400"/>
+            <a:ext cx="10083800" cy="2966453"/>
+          </a:xfrm>
+          <a:prstGeom prst="rect">
+            <a:avLst/>
+          </a:prstGeom>
+        </p:spPr>
+        <p:style>
+          <a:lnRef idx="2">
+            <a:schemeClr val="accent2"/>
+          </a:lnRef>
+          <a:fillRef idx="1">
+            <a:schemeClr val="lt1"/>
+          </a:fillRef>
+          <a:effectRef idx="0">
+            <a:schemeClr val="accent2"/>
+          </a:effectRef>
+          <a:fontRef idx="minor">
+            <a:schemeClr val="dk1"/>
+          </a:fontRef>
+        </p:style>
+        <p:txBody>
+          <a:bodyPr wrap="square">
+            <a:spAutoFit/>
+          </a:bodyPr>
+          <a:lstStyle/>
+          <a:p>
+            <a:pPr algn="just" fontAlgn="base">
+              <a:lnSpc>
+                <a:spcPct val="200000"/>
+              </a:lnSpc>
+            </a:pPr>
+            <a:r>
+              <a:rPr lang="en-US" sz="1600" b="1" i="0" dirty="0">
+                <a:solidFill>
+                  <a:srgbClr val="213343"/>
+                </a:solidFill>
+                <a:effectLst/>
+                <a:latin typeface="Verdana" panose="020B0604030504040204" pitchFamily="34" charset="0"/>
+                <a:ea typeface="Verdana" panose="020B0604030504040204" pitchFamily="34" charset="0"/>
+              </a:rPr>
+              <a:t>SQL server functions are pre-built actions that perform calculations, manipulate data, and return results. At the most fundamental level, these functions simplify complex queries and automate repetitive tasks.</a:t>
+            </a:r>
+          </a:p>
+          <a:p>
+            <a:pPr algn="just" fontAlgn="base">
+              <a:lnSpc>
+                <a:spcPct val="200000"/>
+              </a:lnSpc>
+            </a:pPr>
+            <a:r>
+              <a:rPr lang="en-US" sz="1600" b="1" i="0" dirty="0">
+                <a:solidFill>
+                  <a:srgbClr val="213343"/>
+                </a:solidFill>
+                <a:effectLst/>
+                <a:latin typeface="Verdana" panose="020B0604030504040204" pitchFamily="34" charset="0"/>
+                <a:ea typeface="Verdana" panose="020B0604030504040204" pitchFamily="34" charset="0"/>
+              </a:rPr>
+              <a:t>Common SQL functions include string, numeric, date/time, conditional, and aggregate functions. These functions give users the ability to extract and analyze data from massive databases efficiently and effectively.</a:t>
+            </a:r>
+          </a:p>
+        </p:txBody>
+      </p:sp>
+    </p:spTree>
+    <p:extLst>
+      <p:ext uri="{BB962C8B-B14F-4D97-AF65-F5344CB8AC3E}">
+        <p14:creationId xmlns:p14="http://schemas.microsoft.com/office/powerpoint/2010/main" val="2767866686"/>
+      </p:ext>
+    </p:extLst>
+  </p:cSld>
+  <p:clrMapOvr>
+    <a:masterClrMapping/>
+  </p:clrMapOvr>
+</p:sld>
+</file>
+
+<file path=ppt/slides/slide20.xml><?xml version="1.0" encoding="utf-8"?>
 <p:sld xmlns:a="http://schemas.openxmlformats.org/drawingml/2006/main" xmlns:r="http://schemas.openxmlformats.org/officeDocument/2006/relationships" xmlns:p="http://schemas.openxmlformats.org/presentationml/2006/main">
   <p:cSld>
     <p:spTree>
@@ -5474,7 +6682,7 @@
 </p:sld>
 </file>
 
-<file path=ppt/slides/slide17.xml><?xml version="1.0" encoding="utf-8"?>
+<file path=ppt/slides/slide21.xml><?xml version="1.0" encoding="utf-8"?>
 <p:sld xmlns:a="http://schemas.openxmlformats.org/drawingml/2006/main" xmlns:r="http://schemas.openxmlformats.org/officeDocument/2006/relationships" xmlns:p="http://schemas.openxmlformats.org/presentationml/2006/main">
   <p:cSld>
     <p:spTree>
@@ -5632,7 +6840,7 @@
 </p:sld>
 </file>
 
-<file path=ppt/slides/slide18.xml><?xml version="1.0" encoding="utf-8"?>
+<file path=ppt/slides/slide22.xml><?xml version="1.0" encoding="utf-8"?>
 <p:sld xmlns:a="http://schemas.openxmlformats.org/drawingml/2006/main" xmlns:r="http://schemas.openxmlformats.org/officeDocument/2006/relationships" xmlns:p="http://schemas.openxmlformats.org/presentationml/2006/main">
   <p:cSld>
     <p:spTree>
@@ -5790,7 +6998,7 @@
 </p:sld>
 </file>
 
-<file path=ppt/slides/slide19.xml><?xml version="1.0" encoding="utf-8"?>
+<file path=ppt/slides/slide23.xml><?xml version="1.0" encoding="utf-8"?>
 <p:sld xmlns:a="http://schemas.openxmlformats.org/drawingml/2006/main" xmlns:r="http://schemas.openxmlformats.org/officeDocument/2006/relationships" xmlns:p="http://schemas.openxmlformats.org/presentationml/2006/main">
   <p:cSld>
     <p:spTree>
@@ -5948,295 +7156,7 @@
 </p:sld>
 </file>
 
-<file path=ppt/slides/slide2.xml><?xml version="1.0" encoding="utf-8"?>
-<p:sld xmlns:a="http://schemas.openxmlformats.org/drawingml/2006/main" xmlns:r="http://schemas.openxmlformats.org/officeDocument/2006/relationships" xmlns:p="http://schemas.openxmlformats.org/presentationml/2006/main">
-  <p:cSld>
-    <p:spTree>
-      <p:nvGrpSpPr>
-        <p:cNvPr id="1" name=""/>
-        <p:cNvGrpSpPr/>
-        <p:nvPr/>
-      </p:nvGrpSpPr>
-      <p:grpSpPr>
-        <a:xfrm>
-          <a:off x="0" y="0"/>
-          <a:ext cx="0" cy="0"/>
-          <a:chOff x="0" y="0"/>
-          <a:chExt cx="0" cy="0"/>
-        </a:xfrm>
-      </p:grpSpPr>
-      <p:sp>
-        <p:nvSpPr>
-          <p:cNvPr id="5" name="TextBox 4">
-            <a:extLst>
-              <a:ext uri="{FF2B5EF4-FFF2-40B4-BE49-F238E27FC236}">
-                <a16:creationId xmlns:a16="http://schemas.microsoft.com/office/drawing/2014/main" id="{44085D18-8669-A35D-D918-DDFE81A3579D}"/>
-              </a:ext>
-            </a:extLst>
-          </p:cNvPr>
-          <p:cNvSpPr txBox="1"/>
-          <p:nvPr/>
-        </p:nvSpPr>
-        <p:spPr>
-          <a:xfrm>
-            <a:off x="2133600" y="0"/>
-            <a:ext cx="7962899" cy="830997"/>
-          </a:xfrm>
-          <a:prstGeom prst="rect">
-            <a:avLst/>
-          </a:prstGeom>
-          <a:noFill/>
-        </p:spPr>
-        <p:txBody>
-          <a:bodyPr wrap="square">
-            <a:spAutoFit/>
-          </a:bodyPr>
-          <a:lstStyle/>
-          <a:p>
-            <a:pPr algn="ctr"/>
-            <a:r>
-              <a:rPr lang="en-US" sz="4800" b="1" i="0" dirty="0">
-                <a:ln w="22225">
-                  <a:solidFill>
-                    <a:schemeClr val="accent2"/>
-                  </a:solidFill>
-                  <a:prstDash val="solid"/>
-                </a:ln>
-                <a:solidFill>
-                  <a:schemeClr val="accent2">
-                    <a:lumMod val="40000"/>
-                    <a:lumOff val="60000"/>
-                  </a:schemeClr>
-                </a:solidFill>
-                <a:highlight>
-                  <a:srgbClr val="FFFFFF"/>
-                </a:highlight>
-                <a:latin typeface="Wotfard"/>
-              </a:rPr>
-              <a:t>What is Function  SQL Server</a:t>
-            </a:r>
-          </a:p>
-        </p:txBody>
-      </p:sp>
-      <p:sp>
-        <p:nvSpPr>
-          <p:cNvPr id="8" name="TextBox 7">
-            <a:extLst>
-              <a:ext uri="{FF2B5EF4-FFF2-40B4-BE49-F238E27FC236}">
-                <a16:creationId xmlns:a16="http://schemas.microsoft.com/office/drawing/2014/main" id="{D617FF5A-41E7-FA17-3FE0-BCB4F89C5357}"/>
-              </a:ext>
-            </a:extLst>
-          </p:cNvPr>
-          <p:cNvSpPr txBox="1"/>
-          <p:nvPr/>
-        </p:nvSpPr>
-        <p:spPr>
-          <a:xfrm>
-            <a:off x="927100" y="830997"/>
-            <a:ext cx="10083800" cy="2529282"/>
-          </a:xfrm>
-          <a:prstGeom prst="rect">
-            <a:avLst/>
-          </a:prstGeom>
-        </p:spPr>
-        <p:style>
-          <a:lnRef idx="2">
-            <a:schemeClr val="accent2"/>
-          </a:lnRef>
-          <a:fillRef idx="1">
-            <a:schemeClr val="lt1"/>
-          </a:fillRef>
-          <a:effectRef idx="0">
-            <a:schemeClr val="accent2"/>
-          </a:effectRef>
-          <a:fontRef idx="minor">
-            <a:schemeClr val="dk1"/>
-          </a:fontRef>
-        </p:style>
-        <p:txBody>
-          <a:bodyPr wrap="square" numCol="1">
-            <a:spAutoFit/>
-          </a:bodyPr>
-          <a:lstStyle/>
-          <a:p>
-            <a:pPr algn="just">
-              <a:lnSpc>
-                <a:spcPct val="150000"/>
-              </a:lnSpc>
-            </a:pPr>
-            <a:r>
-              <a:rPr lang="en-US" b="0" i="0" dirty="0">
-                <a:solidFill>
-                  <a:srgbClr val="181717"/>
-                </a:solidFill>
-                <a:effectLst/>
-                <a:highlight>
-                  <a:srgbClr val="FFFFFF"/>
-                </a:highlight>
-                <a:latin typeface="Verdana" panose="020B0604030504040204" pitchFamily="34" charset="0"/>
-              </a:rPr>
-              <a:t>Functions in SQL Server are similar to functions in other programming languages. Functions in SQL Server contains SQL statements that perform some specific tasks. Functions can have input parameters and must return a single value or multiple records.</a:t>
-            </a:r>
-          </a:p>
-          <a:p>
-            <a:pPr algn="just">
-              <a:lnSpc>
-                <a:spcPct val="150000"/>
-              </a:lnSpc>
-            </a:pPr>
-            <a:r>
-              <a:rPr lang="en-US" b="0" i="0" dirty="0">
-                <a:solidFill>
-                  <a:srgbClr val="181717"/>
-                </a:solidFill>
-                <a:effectLst/>
-                <a:highlight>
-                  <a:srgbClr val="FFFFFF"/>
-                </a:highlight>
-                <a:latin typeface="Verdana" panose="020B0604030504040204" pitchFamily="34" charset="0"/>
-              </a:rPr>
-              <a:t>If your scripts use the same set of SQL statements repeatedly then this can be converted into a function in the database.</a:t>
-            </a:r>
-          </a:p>
-        </p:txBody>
-      </p:sp>
-      <p:sp>
-        <p:nvSpPr>
-          <p:cNvPr id="9" name="AutoShape 2" descr="sqlserver-page">
-            <a:extLst>
-              <a:ext uri="{FF2B5EF4-FFF2-40B4-BE49-F238E27FC236}">
-                <a16:creationId xmlns:a16="http://schemas.microsoft.com/office/drawing/2014/main" id="{391C2F74-10A7-C19E-24EE-7E95D18FFE1C}"/>
-              </a:ext>
-            </a:extLst>
-          </p:cNvPr>
-          <p:cNvSpPr>
-            <a:spLocks noChangeAspect="1" noChangeArrowheads="1"/>
-          </p:cNvSpPr>
-          <p:nvPr/>
-        </p:nvSpPr>
-        <p:spPr bwMode="auto">
-          <a:xfrm>
-            <a:off x="5943600" y="3276600"/>
-            <a:ext cx="304800" cy="304800"/>
-          </a:xfrm>
-          <a:prstGeom prst="rect">
-            <a:avLst/>
-          </a:prstGeom>
-          <a:noFill/>
-          <a:extLst>
-            <a:ext uri="{909E8E84-426E-40DD-AFC4-6F175D3DCCD1}">
-              <a14:hiddenFill xmlns:a14="http://schemas.microsoft.com/office/drawing/2010/main">
-                <a:solidFill>
-                  <a:srgbClr val="FFFFFF"/>
-                </a:solidFill>
-              </a14:hiddenFill>
-            </a:ext>
-          </a:extLst>
-        </p:spPr>
-        <p:txBody>
-          <a:bodyPr vert="horz" wrap="square" lIns="91440" tIns="45720" rIns="91440" bIns="45720" numCol="1" anchor="t" anchorCtr="0" compatLnSpc="1">
-            <a:prstTxWarp prst="textNoShape">
-              <a:avLst/>
-            </a:prstTxWarp>
-          </a:bodyPr>
-          <a:lstStyle/>
-          <a:p>
-            <a:endParaRPr lang="en-US"/>
-          </a:p>
-        </p:txBody>
-      </p:sp>
-      <p:sp>
-        <p:nvSpPr>
-          <p:cNvPr id="3" name="TextBox 2">
-            <a:extLst>
-              <a:ext uri="{FF2B5EF4-FFF2-40B4-BE49-F238E27FC236}">
-                <a16:creationId xmlns:a16="http://schemas.microsoft.com/office/drawing/2014/main" id="{367C1893-77CD-4792-4C75-3575F1DC4B7E}"/>
-              </a:ext>
-            </a:extLst>
-          </p:cNvPr>
-          <p:cNvSpPr txBox="1"/>
-          <p:nvPr/>
-        </p:nvSpPr>
-        <p:spPr>
-          <a:xfrm>
-            <a:off x="927100" y="3581400"/>
-            <a:ext cx="10083800" cy="2966453"/>
-          </a:xfrm>
-          <a:prstGeom prst="rect">
-            <a:avLst/>
-          </a:prstGeom>
-        </p:spPr>
-        <p:style>
-          <a:lnRef idx="2">
-            <a:schemeClr val="accent2"/>
-          </a:lnRef>
-          <a:fillRef idx="1">
-            <a:schemeClr val="lt1"/>
-          </a:fillRef>
-          <a:effectRef idx="0">
-            <a:schemeClr val="accent2"/>
-          </a:effectRef>
-          <a:fontRef idx="minor">
-            <a:schemeClr val="dk1"/>
-          </a:fontRef>
-        </p:style>
-        <p:txBody>
-          <a:bodyPr wrap="square">
-            <a:spAutoFit/>
-          </a:bodyPr>
-          <a:lstStyle/>
-          <a:p>
-            <a:pPr algn="just" fontAlgn="base">
-              <a:lnSpc>
-                <a:spcPct val="200000"/>
-              </a:lnSpc>
-            </a:pPr>
-            <a:r>
-              <a:rPr lang="en-US" sz="1600" b="1" i="0" dirty="0">
-                <a:solidFill>
-                  <a:srgbClr val="213343"/>
-                </a:solidFill>
-                <a:effectLst/>
-                <a:latin typeface="Verdana" panose="020B0604030504040204" pitchFamily="34" charset="0"/>
-                <a:ea typeface="Verdana" panose="020B0604030504040204" pitchFamily="34" charset="0"/>
-              </a:rPr>
-              <a:t>SQL server functions are pre-built actions that perform calculations, manipulate data, and return results. At the most fundamental level, these functions simplify complex queries and automate repetitive tasks.</a:t>
-            </a:r>
-          </a:p>
-          <a:p>
-            <a:pPr algn="just" fontAlgn="base">
-              <a:lnSpc>
-                <a:spcPct val="200000"/>
-              </a:lnSpc>
-            </a:pPr>
-            <a:r>
-              <a:rPr lang="en-US" sz="1600" b="1" i="0" dirty="0">
-                <a:solidFill>
-                  <a:srgbClr val="213343"/>
-                </a:solidFill>
-                <a:effectLst/>
-                <a:latin typeface="Verdana" panose="020B0604030504040204" pitchFamily="34" charset="0"/>
-                <a:ea typeface="Verdana" panose="020B0604030504040204" pitchFamily="34" charset="0"/>
-              </a:rPr>
-              <a:t>Common SQL functions include string, numeric, date/time, conditional, and aggregate functions. These functions give users the ability to extract and analyze data from massive databases efficiently and effectively.</a:t>
-            </a:r>
-          </a:p>
-        </p:txBody>
-      </p:sp>
-    </p:spTree>
-    <p:extLst>
-      <p:ext uri="{BB962C8B-B14F-4D97-AF65-F5344CB8AC3E}">
-        <p14:creationId xmlns:p14="http://schemas.microsoft.com/office/powerpoint/2010/main" val="2767866686"/>
-      </p:ext>
-    </p:extLst>
-  </p:cSld>
-  <p:clrMapOvr>
-    <a:masterClrMapping/>
-  </p:clrMapOvr>
-</p:sld>
-</file>
-
-<file path=ppt/slides/slide20.xml><?xml version="1.0" encoding="utf-8"?>
+<file path=ppt/slides/slide24.xml><?xml version="1.0" encoding="utf-8"?>
 <p:sld xmlns:a="http://schemas.openxmlformats.org/drawingml/2006/main" xmlns:r="http://schemas.openxmlformats.org/officeDocument/2006/relationships" xmlns:p="http://schemas.openxmlformats.org/presentationml/2006/main">
   <p:cSld>
     <p:spTree>
@@ -6394,7 +7314,7 @@
 </p:sld>
 </file>
 
-<file path=ppt/slides/slide21.xml><?xml version="1.0" encoding="utf-8"?>
+<file path=ppt/slides/slide25.xml><?xml version="1.0" encoding="utf-8"?>
 <p:sld xmlns:a="http://schemas.openxmlformats.org/drawingml/2006/main" xmlns:r="http://schemas.openxmlformats.org/officeDocument/2006/relationships" xmlns:p="http://schemas.openxmlformats.org/presentationml/2006/main">
   <p:cSld>
     <p:spTree>
@@ -6552,7 +7472,7 @@
 </p:sld>
 </file>
 
-<file path=ppt/slides/slide22.xml><?xml version="1.0" encoding="utf-8"?>
+<file path=ppt/slides/slide26.xml><?xml version="1.0" encoding="utf-8"?>
 <p:sld xmlns:a="http://schemas.openxmlformats.org/drawingml/2006/main" xmlns:r="http://schemas.openxmlformats.org/officeDocument/2006/relationships" xmlns:p="http://schemas.openxmlformats.org/presentationml/2006/main">
   <p:cSld>
     <p:spTree>

</xml_diff>